<commit_message>
updated linked list slides
</commit_message>
<xml_diff>
--- a/ClassMaterials/LinkedLists/Slides/LinkedLists.pptx
+++ b/ClassMaterials/LinkedLists/Slides/LinkedLists.pptx
@@ -5,10 +5,10 @@
     <p:sldMasterId id="2147484539" r:id="rId4"/>
   </p:sldMasterIdLst>
   <p:notesMasterIdLst>
-    <p:notesMasterId r:id="rId17"/>
+    <p:notesMasterId r:id="rId28"/>
   </p:notesMasterIdLst>
   <p:handoutMasterIdLst>
-    <p:handoutMasterId r:id="rId18"/>
+    <p:handoutMasterId r:id="rId29"/>
   </p:handoutMasterIdLst>
   <p:sldIdLst>
     <p:sldId id="256" r:id="rId5"/>
@@ -23,6 +23,17 @@
     <p:sldId id="347" r:id="rId14"/>
     <p:sldId id="342" r:id="rId15"/>
     <p:sldId id="334" r:id="rId16"/>
+    <p:sldId id="277" r:id="rId17"/>
+    <p:sldId id="356" r:id="rId18"/>
+    <p:sldId id="357" r:id="rId19"/>
+    <p:sldId id="358" r:id="rId20"/>
+    <p:sldId id="359" r:id="rId21"/>
+    <p:sldId id="318" r:id="rId22"/>
+    <p:sldId id="319" r:id="rId23"/>
+    <p:sldId id="360" r:id="rId24"/>
+    <p:sldId id="361" r:id="rId25"/>
+    <p:sldId id="362" r:id="rId26"/>
+    <p:sldId id="332" r:id="rId27"/>
   </p:sldIdLst>
   <p:sldSz cx="9144000" cy="6858000" type="screen4x3"/>
   <p:notesSz cx="6881813" cy="9296400"/>
@@ -316,7 +327,7 @@
               <a:pPr>
                 <a:defRPr/>
               </a:pPr>
-              <a:t>10/28/22</a:t>
+              <a:t>10/31/22</a:t>
             </a:fld>
             <a:endParaRPr lang="en-US"/>
           </a:p>
@@ -551,7 +562,7 @@
               <a:pPr>
                 <a:defRPr/>
               </a:pPr>
-              <a:t>10/28/22</a:t>
+              <a:t>10/31/22</a:t>
             </a:fld>
             <a:endParaRPr lang="en-US"/>
           </a:p>
@@ -1030,6 +1041,614 @@
 </p:notes>
 </file>
 
+<file path=ppt/notesSlides/notesSlide10.xml><?xml version="1.0" encoding="utf-8"?>
+<p:notes xmlns:a="http://schemas.openxmlformats.org/drawingml/2006/main" xmlns:r="http://schemas.openxmlformats.org/officeDocument/2006/relationships" xmlns:p="http://schemas.openxmlformats.org/presentationml/2006/main">
+  <p:cSld>
+    <p:spTree>
+      <p:nvGrpSpPr>
+        <p:cNvPr id="1" name=""/>
+        <p:cNvGrpSpPr/>
+        <p:nvPr/>
+      </p:nvGrpSpPr>
+      <p:grpSpPr>
+        <a:xfrm>
+          <a:off x="0" y="0"/>
+          <a:ext cx="0" cy="0"/>
+          <a:chOff x="0" y="0"/>
+          <a:chExt cx="0" cy="0"/>
+        </a:xfrm>
+      </p:grpSpPr>
+      <p:sp>
+        <p:nvSpPr>
+          <p:cNvPr id="2" name="Slide Image Placeholder 1"/>
+          <p:cNvSpPr>
+            <a:spLocks noGrp="1" noRot="1" noChangeAspect="1"/>
+          </p:cNvSpPr>
+          <p:nvPr>
+            <p:ph type="sldImg"/>
+          </p:nvPr>
+        </p:nvSpPr>
+        <p:spPr/>
+      </p:sp>
+      <p:sp>
+        <p:nvSpPr>
+          <p:cNvPr id="3" name="Notes Placeholder 2"/>
+          <p:cNvSpPr>
+            <a:spLocks noGrp="1"/>
+          </p:cNvSpPr>
+          <p:nvPr>
+            <p:ph type="body" idx="1"/>
+          </p:nvPr>
+        </p:nvSpPr>
+        <p:spPr/>
+        <p:txBody>
+          <a:bodyPr/>
+          <a:lstStyle/>
+          <a:p>
+            <a:endParaRPr lang="en-US"/>
+          </a:p>
+        </p:txBody>
+      </p:sp>
+      <p:sp>
+        <p:nvSpPr>
+          <p:cNvPr id="4" name="Slide Number Placeholder 3"/>
+          <p:cNvSpPr>
+            <a:spLocks noGrp="1"/>
+          </p:cNvSpPr>
+          <p:nvPr>
+            <p:ph type="sldNum" sz="quarter" idx="10"/>
+          </p:nvPr>
+        </p:nvSpPr>
+        <p:spPr/>
+        <p:txBody>
+          <a:bodyPr/>
+          <a:lstStyle/>
+          <a:p>
+            <a:pPr>
+              <a:defRPr/>
+            </a:pPr>
+            <a:fld id="{BDF97A26-8EDD-4564-9705-85BE5B01BB34}" type="slidenum">
+              <a:rPr lang="en-US" smtClean="0"/>
+              <a:pPr>
+                <a:defRPr/>
+              </a:pPr>
+              <a:t>18</a:t>
+            </a:fld>
+            <a:endParaRPr lang="en-US"/>
+          </a:p>
+        </p:txBody>
+      </p:sp>
+    </p:spTree>
+    <p:extLst>
+      <p:ext uri="{BB962C8B-B14F-4D97-AF65-F5344CB8AC3E}">
+        <p14:creationId xmlns:p14="http://schemas.microsoft.com/office/powerpoint/2010/main" val="317362217"/>
+      </p:ext>
+    </p:extLst>
+  </p:cSld>
+  <p:clrMapOvr>
+    <a:masterClrMapping/>
+  </p:clrMapOvr>
+</p:notes>
+</file>
+
+<file path=ppt/notesSlides/notesSlide11.xml><?xml version="1.0" encoding="utf-8"?>
+<p:notes xmlns:a="http://schemas.openxmlformats.org/drawingml/2006/main" xmlns:r="http://schemas.openxmlformats.org/officeDocument/2006/relationships" xmlns:p="http://schemas.openxmlformats.org/presentationml/2006/main">
+  <p:cSld>
+    <p:spTree>
+      <p:nvGrpSpPr>
+        <p:cNvPr id="1" name=""/>
+        <p:cNvGrpSpPr/>
+        <p:nvPr/>
+      </p:nvGrpSpPr>
+      <p:grpSpPr>
+        <a:xfrm>
+          <a:off x="0" y="0"/>
+          <a:ext cx="0" cy="0"/>
+          <a:chOff x="0" y="0"/>
+          <a:chExt cx="0" cy="0"/>
+        </a:xfrm>
+      </p:grpSpPr>
+      <p:sp>
+        <p:nvSpPr>
+          <p:cNvPr id="2" name="Slide Image Placeholder 1"/>
+          <p:cNvSpPr>
+            <a:spLocks noGrp="1" noRot="1" noChangeAspect="1"/>
+          </p:cNvSpPr>
+          <p:nvPr>
+            <p:ph type="sldImg"/>
+          </p:nvPr>
+        </p:nvSpPr>
+        <p:spPr/>
+      </p:sp>
+      <p:sp>
+        <p:nvSpPr>
+          <p:cNvPr id="3" name="Notes Placeholder 2"/>
+          <p:cNvSpPr>
+            <a:spLocks noGrp="1"/>
+          </p:cNvSpPr>
+          <p:nvPr>
+            <p:ph type="body" idx="1"/>
+          </p:nvPr>
+        </p:nvSpPr>
+        <p:spPr/>
+        <p:txBody>
+          <a:bodyPr/>
+          <a:lstStyle/>
+          <a:p>
+            <a:r>
+              <a:rPr lang="en-US" dirty="0"/>
+              <a:t>We care about which part of the expression grows the fastest as n,</a:t>
+            </a:r>
+            <a:r>
+              <a:rPr lang="en-US" baseline="0" dirty="0"/>
+              <a:t> the input size, grows.</a:t>
+            </a:r>
+            <a:endParaRPr lang="en-US" dirty="0"/>
+          </a:p>
+        </p:txBody>
+      </p:sp>
+      <p:sp>
+        <p:nvSpPr>
+          <p:cNvPr id="4" name="Slide Number Placeholder 3"/>
+          <p:cNvSpPr>
+            <a:spLocks noGrp="1"/>
+          </p:cNvSpPr>
+          <p:nvPr>
+            <p:ph type="sldNum" sz="quarter" idx="10"/>
+          </p:nvPr>
+        </p:nvSpPr>
+        <p:spPr/>
+        <p:txBody>
+          <a:bodyPr/>
+          <a:lstStyle/>
+          <a:p>
+            <a:pPr>
+              <a:defRPr/>
+            </a:pPr>
+            <a:fld id="{BDF97A26-8EDD-4564-9705-85BE5B01BB34}" type="slidenum">
+              <a:rPr lang="en-US" smtClean="0"/>
+              <a:pPr>
+                <a:defRPr/>
+              </a:pPr>
+              <a:t>19</a:t>
+            </a:fld>
+            <a:endParaRPr lang="en-US"/>
+          </a:p>
+        </p:txBody>
+      </p:sp>
+    </p:spTree>
+    <p:extLst>
+      <p:ext uri="{BB962C8B-B14F-4D97-AF65-F5344CB8AC3E}">
+        <p14:creationId xmlns:p14="http://schemas.microsoft.com/office/powerpoint/2010/main" val="1864529778"/>
+      </p:ext>
+    </p:extLst>
+  </p:cSld>
+  <p:clrMapOvr>
+    <a:masterClrMapping/>
+  </p:clrMapOvr>
+</p:notes>
+</file>
+
+<file path=ppt/notesSlides/notesSlide12.xml><?xml version="1.0" encoding="utf-8"?>
+<p:notes xmlns:a="http://schemas.openxmlformats.org/drawingml/2006/main" xmlns:r="http://schemas.openxmlformats.org/officeDocument/2006/relationships" xmlns:p="http://schemas.openxmlformats.org/presentationml/2006/main">
+  <p:cSld>
+    <p:spTree>
+      <p:nvGrpSpPr>
+        <p:cNvPr id="1" name=""/>
+        <p:cNvGrpSpPr/>
+        <p:nvPr/>
+      </p:nvGrpSpPr>
+      <p:grpSpPr>
+        <a:xfrm>
+          <a:off x="0" y="0"/>
+          <a:ext cx="0" cy="0"/>
+          <a:chOff x="0" y="0"/>
+          <a:chExt cx="0" cy="0"/>
+        </a:xfrm>
+      </p:grpSpPr>
+      <p:sp>
+        <p:nvSpPr>
+          <p:cNvPr id="2" name="Slide Image Placeholder 1"/>
+          <p:cNvSpPr>
+            <a:spLocks noGrp="1" noRot="1" noChangeAspect="1"/>
+          </p:cNvSpPr>
+          <p:nvPr>
+            <p:ph type="sldImg"/>
+          </p:nvPr>
+        </p:nvSpPr>
+        <p:spPr/>
+      </p:sp>
+      <p:sp>
+        <p:nvSpPr>
+          <p:cNvPr id="3" name="Notes Placeholder 2"/>
+          <p:cNvSpPr>
+            <a:spLocks noGrp="1"/>
+          </p:cNvSpPr>
+          <p:nvPr>
+            <p:ph type="body" idx="1"/>
+          </p:nvPr>
+        </p:nvSpPr>
+        <p:spPr/>
+        <p:txBody>
+          <a:bodyPr/>
+          <a:lstStyle/>
+          <a:p>
+            <a:endParaRPr lang="en-US"/>
+          </a:p>
+        </p:txBody>
+      </p:sp>
+      <p:sp>
+        <p:nvSpPr>
+          <p:cNvPr id="4" name="Slide Number Placeholder 3"/>
+          <p:cNvSpPr>
+            <a:spLocks noGrp="1"/>
+          </p:cNvSpPr>
+          <p:nvPr>
+            <p:ph type="sldNum" sz="quarter" idx="10"/>
+          </p:nvPr>
+        </p:nvSpPr>
+        <p:spPr/>
+        <p:txBody>
+          <a:bodyPr/>
+          <a:lstStyle/>
+          <a:p>
+            <a:pPr>
+              <a:defRPr/>
+            </a:pPr>
+            <a:fld id="{BDF97A26-8EDD-4564-9705-85BE5B01BB34}" type="slidenum">
+              <a:rPr lang="en-US" smtClean="0"/>
+              <a:pPr>
+                <a:defRPr/>
+              </a:pPr>
+              <a:t>20</a:t>
+            </a:fld>
+            <a:endParaRPr lang="en-US"/>
+          </a:p>
+        </p:txBody>
+      </p:sp>
+    </p:spTree>
+    <p:extLst>
+      <p:ext uri="{BB962C8B-B14F-4D97-AF65-F5344CB8AC3E}">
+        <p14:creationId xmlns:p14="http://schemas.microsoft.com/office/powerpoint/2010/main" val="1455335898"/>
+      </p:ext>
+    </p:extLst>
+  </p:cSld>
+  <p:clrMapOvr>
+    <a:masterClrMapping/>
+  </p:clrMapOvr>
+</p:notes>
+</file>
+
+<file path=ppt/notesSlides/notesSlide13.xml><?xml version="1.0" encoding="utf-8"?>
+<p:notes xmlns:a="http://schemas.openxmlformats.org/drawingml/2006/main" xmlns:r="http://schemas.openxmlformats.org/officeDocument/2006/relationships" xmlns:p="http://schemas.openxmlformats.org/presentationml/2006/main">
+  <p:cSld>
+    <p:spTree>
+      <p:nvGrpSpPr>
+        <p:cNvPr id="1" name=""/>
+        <p:cNvGrpSpPr/>
+        <p:nvPr/>
+      </p:nvGrpSpPr>
+      <p:grpSpPr>
+        <a:xfrm>
+          <a:off x="0" y="0"/>
+          <a:ext cx="0" cy="0"/>
+          <a:chOff x="0" y="0"/>
+          <a:chExt cx="0" cy="0"/>
+        </a:xfrm>
+      </p:grpSpPr>
+      <p:sp>
+        <p:nvSpPr>
+          <p:cNvPr id="65538" name="Slide Image Placeholder 1"/>
+          <p:cNvSpPr>
+            <a:spLocks noGrp="1" noRot="1" noChangeAspect="1" noTextEdit="1"/>
+          </p:cNvSpPr>
+          <p:nvPr>
+            <p:ph type="sldImg"/>
+          </p:nvPr>
+        </p:nvSpPr>
+        <p:spPr bwMode="auto">
+          <a:noFill/>
+          <a:ln>
+            <a:solidFill>
+              <a:srgbClr val="000000"/>
+            </a:solidFill>
+            <a:miter lim="800000"/>
+            <a:headEnd/>
+            <a:tailEnd/>
+          </a:ln>
+        </p:spPr>
+      </p:sp>
+      <p:sp>
+        <p:nvSpPr>
+          <p:cNvPr id="65539" name="Notes Placeholder 2"/>
+          <p:cNvSpPr>
+            <a:spLocks noGrp="1"/>
+          </p:cNvSpPr>
+          <p:nvPr>
+            <p:ph type="body" idx="1"/>
+          </p:nvPr>
+        </p:nvSpPr>
+        <p:spPr>
+          <a:noFill/>
+          <a:ln/>
+        </p:spPr>
+        <p:txBody>
+          <a:bodyPr/>
+          <a:lstStyle/>
+          <a:p>
+            <a:r>
+              <a:rPr lang="en-US"/>
+              <a:t>- Examples: employee list, music play list</a:t>
+            </a:r>
+          </a:p>
+          <a:p>
+            <a:r>
+              <a:rPr lang="en-US"/>
+              <a:t>Sketch a linked list on the board</a:t>
+            </a:r>
+            <a:r>
+              <a:rPr lang="en-US" baseline="0"/>
+              <a:t> for “two more weeks” (quiz #3)</a:t>
+            </a:r>
+            <a:endParaRPr lang="en-US"/>
+          </a:p>
+          <a:p>
+            <a:endParaRPr lang="en-US"/>
+          </a:p>
+          <a:p>
+            <a:r>
+              <a:rPr lang="en-US"/>
+              <a:t>Then show insertion and deletion.  </a:t>
+            </a:r>
+          </a:p>
+        </p:txBody>
+      </p:sp>
+      <p:sp>
+        <p:nvSpPr>
+          <p:cNvPr id="65540" name="Slide Number Placeholder 3"/>
+          <p:cNvSpPr>
+            <a:spLocks noGrp="1"/>
+          </p:cNvSpPr>
+          <p:nvPr>
+            <p:ph type="sldNum" sz="quarter" idx="5"/>
+          </p:nvPr>
+        </p:nvSpPr>
+        <p:spPr>
+          <a:noFill/>
+        </p:spPr>
+        <p:txBody>
+          <a:bodyPr/>
+          <a:lstStyle/>
+          <a:p>
+            <a:fld id="{DBC8B16D-3522-4DF2-8915-4B0542FC956A}" type="slidenum">
+              <a:rPr lang="en-US" smtClean="0"/>
+              <a:pPr/>
+              <a:t>21</a:t>
+            </a:fld>
+            <a:endParaRPr lang="en-US"/>
+          </a:p>
+        </p:txBody>
+      </p:sp>
+    </p:spTree>
+    <p:extLst>
+      <p:ext uri="{BB962C8B-B14F-4D97-AF65-F5344CB8AC3E}">
+        <p14:creationId xmlns:p14="http://schemas.microsoft.com/office/powerpoint/2010/main" val="3647241296"/>
+      </p:ext>
+    </p:extLst>
+  </p:cSld>
+  <p:clrMapOvr>
+    <a:masterClrMapping/>
+  </p:clrMapOvr>
+</p:notes>
+</file>
+
+<file path=ppt/notesSlides/notesSlide14.xml><?xml version="1.0" encoding="utf-8"?>
+<p:notes xmlns:a="http://schemas.openxmlformats.org/drawingml/2006/main" xmlns:r="http://schemas.openxmlformats.org/officeDocument/2006/relationships" xmlns:p="http://schemas.openxmlformats.org/presentationml/2006/main">
+  <p:cSld>
+    <p:spTree>
+      <p:nvGrpSpPr>
+        <p:cNvPr id="1" name=""/>
+        <p:cNvGrpSpPr/>
+        <p:nvPr/>
+      </p:nvGrpSpPr>
+      <p:grpSpPr>
+        <a:xfrm>
+          <a:off x="0" y="0"/>
+          <a:ext cx="0" cy="0"/>
+          <a:chOff x="0" y="0"/>
+          <a:chExt cx="0" cy="0"/>
+        </a:xfrm>
+      </p:grpSpPr>
+      <p:sp>
+        <p:nvSpPr>
+          <p:cNvPr id="40962" name="Rectangle 2"/>
+          <p:cNvSpPr>
+            <a:spLocks noGrp="1" noRot="1" noChangeAspect="1" noTextEdit="1"/>
+          </p:cNvSpPr>
+          <p:nvPr>
+            <p:ph type="sldImg"/>
+          </p:nvPr>
+        </p:nvSpPr>
+        <p:spPr bwMode="auto">
+          <a:noFill/>
+          <a:ln>
+            <a:solidFill>
+              <a:srgbClr val="000000"/>
+            </a:solidFill>
+            <a:miter lim="800000"/>
+            <a:headEnd/>
+            <a:tailEnd/>
+          </a:ln>
+        </p:spPr>
+      </p:sp>
+      <p:sp>
+        <p:nvSpPr>
+          <p:cNvPr id="40963" name="Rectangle 3"/>
+          <p:cNvSpPr>
+            <a:spLocks noGrp="1"/>
+          </p:cNvSpPr>
+          <p:nvPr>
+            <p:ph type="body" idx="1"/>
+          </p:nvPr>
+        </p:nvSpPr>
+        <p:spPr>
+          <a:noFill/>
+          <a:ln/>
+        </p:spPr>
+        <p:txBody>
+          <a:bodyPr/>
+          <a:lstStyle/>
+          <a:p>
+            <a:r>
+              <a:rPr lang="en-US"/>
+              <a:t>Big-Oh of each?</a:t>
+            </a:r>
+          </a:p>
+          <a:p>
+            <a:endParaRPr lang="en-US"/>
+          </a:p>
+          <a:p>
+            <a:r>
+              <a:rPr lang="en-US" sz="1200" kern="1200">
+                <a:solidFill>
+                  <a:schemeClr val="tx1"/>
+                </a:solidFill>
+                <a:latin typeface="+mn-lt"/>
+                <a:ea typeface="+mn-ea"/>
+                <a:cs typeface="+mn-cs"/>
+              </a:rPr>
+              <a:t>All of the operations perform as could be expected for a doubly-linked list. </a:t>
+            </a:r>
+          </a:p>
+          <a:p>
+            <a:endParaRPr lang="en-US" sz="1200" kern="1200">
+              <a:solidFill>
+                <a:schemeClr val="tx1"/>
+              </a:solidFill>
+              <a:latin typeface="+mn-lt"/>
+              <a:ea typeface="+mn-ea"/>
+              <a:cs typeface="+mn-cs"/>
+            </a:endParaRPr>
+          </a:p>
+          <a:p>
+            <a:r>
+              <a:rPr lang="en-US" sz="1200" kern="1200">
+                <a:solidFill>
+                  <a:schemeClr val="tx1"/>
+                </a:solidFill>
+                <a:latin typeface="+mn-lt"/>
+                <a:ea typeface="+mn-ea"/>
+                <a:cs typeface="+mn-cs"/>
+              </a:rPr>
+              <a:t>Thus, these operations all take O(1) time.</a:t>
+            </a:r>
+            <a:endParaRPr lang="en-US"/>
+          </a:p>
+        </p:txBody>
+      </p:sp>
+    </p:spTree>
+    <p:extLst>
+      <p:ext uri="{BB962C8B-B14F-4D97-AF65-F5344CB8AC3E}">
+        <p14:creationId xmlns:p14="http://schemas.microsoft.com/office/powerpoint/2010/main" val="2944510501"/>
+      </p:ext>
+    </p:extLst>
+  </p:cSld>
+  <p:clrMapOvr>
+    <a:masterClrMapping/>
+  </p:clrMapOvr>
+</p:notes>
+</file>
+
+<file path=ppt/notesSlides/notesSlide15.xml><?xml version="1.0" encoding="utf-8"?>
+<p:notes xmlns:a="http://schemas.openxmlformats.org/drawingml/2006/main" xmlns:r="http://schemas.openxmlformats.org/officeDocument/2006/relationships" xmlns:p="http://schemas.openxmlformats.org/presentationml/2006/main">
+  <p:cSld>
+    <p:spTree>
+      <p:nvGrpSpPr>
+        <p:cNvPr id="1" name=""/>
+        <p:cNvGrpSpPr/>
+        <p:nvPr/>
+      </p:nvGrpSpPr>
+      <p:grpSpPr>
+        <a:xfrm>
+          <a:off x="0" y="0"/>
+          <a:ext cx="0" cy="0"/>
+          <a:chOff x="0" y="0"/>
+          <a:chExt cx="0" cy="0"/>
+        </a:xfrm>
+      </p:grpSpPr>
+      <p:sp>
+        <p:nvSpPr>
+          <p:cNvPr id="2" name="Slide Image Placeholder 1"/>
+          <p:cNvSpPr>
+            <a:spLocks noGrp="1" noRot="1" noChangeAspect="1"/>
+          </p:cNvSpPr>
+          <p:nvPr>
+            <p:ph type="sldImg"/>
+          </p:nvPr>
+        </p:nvSpPr>
+        <p:spPr/>
+      </p:sp>
+      <p:sp>
+        <p:nvSpPr>
+          <p:cNvPr id="3" name="Notes Placeholder 2"/>
+          <p:cNvSpPr>
+            <a:spLocks noGrp="1"/>
+          </p:cNvSpPr>
+          <p:nvPr>
+            <p:ph type="body" idx="1"/>
+          </p:nvPr>
+        </p:nvSpPr>
+        <p:spPr/>
+        <p:txBody>
+          <a:bodyPr/>
+          <a:lstStyle/>
+          <a:p>
+            <a:endParaRPr lang="en-US" dirty="0"/>
+          </a:p>
+        </p:txBody>
+      </p:sp>
+      <p:sp>
+        <p:nvSpPr>
+          <p:cNvPr id="4" name="Slide Number Placeholder 3"/>
+          <p:cNvSpPr>
+            <a:spLocks noGrp="1"/>
+          </p:cNvSpPr>
+          <p:nvPr>
+            <p:ph type="sldNum" sz="quarter" idx="10"/>
+          </p:nvPr>
+        </p:nvSpPr>
+        <p:spPr/>
+        <p:txBody>
+          <a:bodyPr/>
+          <a:lstStyle/>
+          <a:p>
+            <a:pPr>
+              <a:defRPr/>
+            </a:pPr>
+            <a:fld id="{BDF97A26-8EDD-4564-9705-85BE5B01BB34}" type="slidenum">
+              <a:rPr lang="en-US" smtClean="0"/>
+              <a:pPr>
+                <a:defRPr/>
+              </a:pPr>
+              <a:t>23</a:t>
+            </a:fld>
+            <a:endParaRPr lang="en-US"/>
+          </a:p>
+        </p:txBody>
+      </p:sp>
+    </p:spTree>
+    <p:extLst>
+      <p:ext uri="{BB962C8B-B14F-4D97-AF65-F5344CB8AC3E}">
+        <p14:creationId xmlns:p14="http://schemas.microsoft.com/office/powerpoint/2010/main" val="2526261208"/>
+      </p:ext>
+    </p:extLst>
+  </p:cSld>
+  <p:clrMapOvr>
+    <a:masterClrMapping/>
+  </p:clrMapOvr>
+</p:notes>
+</file>
+
 <file path=ppt/notesSlides/notesSlide2.xml><?xml version="1.0" encoding="utf-8"?>
 <p:notes xmlns:a="http://schemas.openxmlformats.org/drawingml/2006/main" xmlns:r="http://schemas.openxmlformats.org/officeDocument/2006/relationships" xmlns:p="http://schemas.openxmlformats.org/presentationml/2006/main">
   <p:cSld>
@@ -1294,6 +1913,526 @@
     <p:extLst>
       <p:ext uri="{BB962C8B-B14F-4D97-AF65-F5344CB8AC3E}">
         <p14:creationId xmlns:p14="http://schemas.microsoft.com/office/powerpoint/2010/main" val="3093329614"/>
+      </p:ext>
+    </p:extLst>
+  </p:cSld>
+  <p:clrMapOvr>
+    <a:masterClrMapping/>
+  </p:clrMapOvr>
+</p:notes>
+</file>
+
+<file path=ppt/notesSlides/notesSlide5.xml><?xml version="1.0" encoding="utf-8"?>
+<p:notes xmlns:a="http://schemas.openxmlformats.org/drawingml/2006/main" xmlns:r="http://schemas.openxmlformats.org/officeDocument/2006/relationships" xmlns:p="http://schemas.openxmlformats.org/presentationml/2006/main">
+  <p:cSld>
+    <p:spTree>
+      <p:nvGrpSpPr>
+        <p:cNvPr id="1" name=""/>
+        <p:cNvGrpSpPr/>
+        <p:nvPr/>
+      </p:nvGrpSpPr>
+      <p:grpSpPr>
+        <a:xfrm>
+          <a:off x="0" y="0"/>
+          <a:ext cx="0" cy="0"/>
+          <a:chOff x="0" y="0"/>
+          <a:chExt cx="0" cy="0"/>
+        </a:xfrm>
+      </p:grpSpPr>
+      <p:sp>
+        <p:nvSpPr>
+          <p:cNvPr id="37890" name="Slide Image Placeholder 1"/>
+          <p:cNvSpPr>
+            <a:spLocks noGrp="1" noRot="1" noChangeAspect="1" noTextEdit="1"/>
+          </p:cNvSpPr>
+          <p:nvPr>
+            <p:ph type="sldImg"/>
+          </p:nvPr>
+        </p:nvSpPr>
+        <p:spPr bwMode="auto">
+          <a:noFill/>
+          <a:ln>
+            <a:solidFill>
+              <a:srgbClr val="000000"/>
+            </a:solidFill>
+            <a:miter lim="800000"/>
+            <a:headEnd/>
+            <a:tailEnd/>
+          </a:ln>
+        </p:spPr>
+      </p:sp>
+      <p:sp>
+        <p:nvSpPr>
+          <p:cNvPr id="37891" name="Notes Placeholder 2"/>
+          <p:cNvSpPr>
+            <a:spLocks noGrp="1"/>
+          </p:cNvSpPr>
+          <p:nvPr>
+            <p:ph type="body" idx="1"/>
+          </p:nvPr>
+        </p:nvSpPr>
+        <p:spPr>
+          <a:noFill/>
+          <a:ln/>
+        </p:spPr>
+        <p:txBody>
+          <a:bodyPr/>
+          <a:lstStyle/>
+          <a:p>
+            <a:r>
+              <a:rPr lang="en-US" dirty="0"/>
+              <a:t>If students get through things quickly</a:t>
+            </a:r>
+            <a:r>
+              <a:rPr lang="en-US" baseline="0" dirty="0"/>
+              <a:t> we can move into this material in the first hour, but if not- that is OK, we have the next class period to go through it and give them time to work on the rest of the quiz and the homework problems.</a:t>
+            </a:r>
+            <a:endParaRPr lang="en-US" dirty="0"/>
+          </a:p>
+        </p:txBody>
+      </p:sp>
+      <p:sp>
+        <p:nvSpPr>
+          <p:cNvPr id="37892" name="Slide Number Placeholder 3"/>
+          <p:cNvSpPr>
+            <a:spLocks noGrp="1"/>
+          </p:cNvSpPr>
+          <p:nvPr>
+            <p:ph type="sldNum" sz="quarter" idx="5"/>
+          </p:nvPr>
+        </p:nvSpPr>
+        <p:spPr>
+          <a:noFill/>
+        </p:spPr>
+        <p:txBody>
+          <a:bodyPr/>
+          <a:lstStyle/>
+          <a:p>
+            <a:fld id="{3F61CCCE-EBAC-4FB5-91D4-9759E6271461}" type="slidenum">
+              <a:rPr lang="en-US" smtClean="0"/>
+              <a:pPr/>
+              <a:t>13</a:t>
+            </a:fld>
+            <a:endParaRPr lang="en-US"/>
+          </a:p>
+        </p:txBody>
+      </p:sp>
+    </p:spTree>
+    <p:extLst>
+      <p:ext uri="{BB962C8B-B14F-4D97-AF65-F5344CB8AC3E}">
+        <p14:creationId xmlns:p14="http://schemas.microsoft.com/office/powerpoint/2010/main" val="248893057"/>
+      </p:ext>
+    </p:extLst>
+  </p:cSld>
+  <p:clrMapOvr>
+    <a:masterClrMapping/>
+  </p:clrMapOvr>
+</p:notes>
+</file>
+
+<file path=ppt/notesSlides/notesSlide6.xml><?xml version="1.0" encoding="utf-8"?>
+<p:notes xmlns:a="http://schemas.openxmlformats.org/drawingml/2006/main" xmlns:r="http://schemas.openxmlformats.org/officeDocument/2006/relationships" xmlns:p="http://schemas.openxmlformats.org/presentationml/2006/main">
+  <p:cSld>
+    <p:spTree>
+      <p:nvGrpSpPr>
+        <p:cNvPr id="1" name=""/>
+        <p:cNvGrpSpPr/>
+        <p:nvPr/>
+      </p:nvGrpSpPr>
+      <p:grpSpPr>
+        <a:xfrm>
+          <a:off x="0" y="0"/>
+          <a:ext cx="0" cy="0"/>
+          <a:chOff x="0" y="0"/>
+          <a:chExt cx="0" cy="0"/>
+        </a:xfrm>
+      </p:grpSpPr>
+      <p:sp>
+        <p:nvSpPr>
+          <p:cNvPr id="38914" name="Slide Image Placeholder 1"/>
+          <p:cNvSpPr>
+            <a:spLocks noGrp="1" noRot="1" noChangeAspect="1" noTextEdit="1"/>
+          </p:cNvSpPr>
+          <p:nvPr>
+            <p:ph type="sldImg"/>
+          </p:nvPr>
+        </p:nvSpPr>
+        <p:spPr bwMode="auto">
+          <a:noFill/>
+          <a:ln>
+            <a:solidFill>
+              <a:srgbClr val="000000"/>
+            </a:solidFill>
+            <a:miter lim="800000"/>
+            <a:headEnd/>
+            <a:tailEnd/>
+          </a:ln>
+        </p:spPr>
+      </p:sp>
+      <p:sp>
+        <p:nvSpPr>
+          <p:cNvPr id="38915" name="Notes Placeholder 2"/>
+          <p:cNvSpPr>
+            <a:spLocks noGrp="1"/>
+          </p:cNvSpPr>
+          <p:nvPr>
+            <p:ph type="body" idx="1"/>
+          </p:nvPr>
+        </p:nvSpPr>
+        <p:spPr>
+          <a:noFill/>
+          <a:ln/>
+        </p:spPr>
+        <p:txBody>
+          <a:bodyPr/>
+          <a:lstStyle/>
+          <a:p>
+            <a:r>
+              <a:rPr lang="en-US"/>
+              <a:t>Q: Have to move all the other elements up or down to make/use room.  O(n)</a:t>
+            </a:r>
+          </a:p>
+        </p:txBody>
+      </p:sp>
+      <p:sp>
+        <p:nvSpPr>
+          <p:cNvPr id="38916" name="Slide Number Placeholder 3"/>
+          <p:cNvSpPr>
+            <a:spLocks noGrp="1"/>
+          </p:cNvSpPr>
+          <p:nvPr>
+            <p:ph type="sldNum" sz="quarter" idx="5"/>
+          </p:nvPr>
+        </p:nvSpPr>
+        <p:spPr>
+          <a:noFill/>
+        </p:spPr>
+        <p:txBody>
+          <a:bodyPr/>
+          <a:lstStyle/>
+          <a:p>
+            <a:fld id="{44E6C81E-B2A6-437F-BF75-B7739F182E02}" type="slidenum">
+              <a:rPr lang="en-US" smtClean="0"/>
+              <a:pPr/>
+              <a:t>14</a:t>
+            </a:fld>
+            <a:endParaRPr lang="en-US"/>
+          </a:p>
+        </p:txBody>
+      </p:sp>
+    </p:spTree>
+    <p:extLst>
+      <p:ext uri="{BB962C8B-B14F-4D97-AF65-F5344CB8AC3E}">
+        <p14:creationId xmlns:p14="http://schemas.microsoft.com/office/powerpoint/2010/main" val="3971722243"/>
+      </p:ext>
+    </p:extLst>
+  </p:cSld>
+  <p:clrMapOvr>
+    <a:masterClrMapping/>
+  </p:clrMapOvr>
+</p:notes>
+</file>
+
+<file path=ppt/notesSlides/notesSlide7.xml><?xml version="1.0" encoding="utf-8"?>
+<p:notes xmlns:a="http://schemas.openxmlformats.org/drawingml/2006/main" xmlns:r="http://schemas.openxmlformats.org/officeDocument/2006/relationships" xmlns:p="http://schemas.openxmlformats.org/presentationml/2006/main">
+  <p:cSld>
+    <p:spTree>
+      <p:nvGrpSpPr>
+        <p:cNvPr id="1" name=""/>
+        <p:cNvGrpSpPr/>
+        <p:nvPr/>
+      </p:nvGrpSpPr>
+      <p:grpSpPr>
+        <a:xfrm>
+          <a:off x="0" y="0"/>
+          <a:ext cx="0" cy="0"/>
+          <a:chOff x="0" y="0"/>
+          <a:chExt cx="0" cy="0"/>
+        </a:xfrm>
+      </p:grpSpPr>
+      <p:sp>
+        <p:nvSpPr>
+          <p:cNvPr id="38914" name="Slide Image Placeholder 1"/>
+          <p:cNvSpPr>
+            <a:spLocks noGrp="1" noRot="1" noChangeAspect="1" noTextEdit="1"/>
+          </p:cNvSpPr>
+          <p:nvPr>
+            <p:ph type="sldImg"/>
+          </p:nvPr>
+        </p:nvSpPr>
+        <p:spPr bwMode="auto">
+          <a:noFill/>
+          <a:ln>
+            <a:solidFill>
+              <a:srgbClr val="000000"/>
+            </a:solidFill>
+            <a:miter lim="800000"/>
+            <a:headEnd/>
+            <a:tailEnd/>
+          </a:ln>
+        </p:spPr>
+      </p:sp>
+      <p:sp>
+        <p:nvSpPr>
+          <p:cNvPr id="38915" name="Notes Placeholder 2"/>
+          <p:cNvSpPr>
+            <a:spLocks noGrp="1"/>
+          </p:cNvSpPr>
+          <p:nvPr>
+            <p:ph type="body" idx="1"/>
+          </p:nvPr>
+        </p:nvSpPr>
+        <p:spPr>
+          <a:noFill/>
+          <a:ln/>
+        </p:spPr>
+        <p:txBody>
+          <a:bodyPr/>
+          <a:lstStyle/>
+          <a:p>
+            <a:r>
+              <a:rPr lang="en-US"/>
+              <a:t>Q: Have to move all the other elements up or down to make/use room.  O(n)</a:t>
+            </a:r>
+          </a:p>
+        </p:txBody>
+      </p:sp>
+      <p:sp>
+        <p:nvSpPr>
+          <p:cNvPr id="38916" name="Slide Number Placeholder 3"/>
+          <p:cNvSpPr>
+            <a:spLocks noGrp="1"/>
+          </p:cNvSpPr>
+          <p:nvPr>
+            <p:ph type="sldNum" sz="quarter" idx="5"/>
+          </p:nvPr>
+        </p:nvSpPr>
+        <p:spPr>
+          <a:noFill/>
+        </p:spPr>
+        <p:txBody>
+          <a:bodyPr/>
+          <a:lstStyle/>
+          <a:p>
+            <a:fld id="{44E6C81E-B2A6-437F-BF75-B7739F182E02}" type="slidenum">
+              <a:rPr lang="en-US" smtClean="0"/>
+              <a:pPr/>
+              <a:t>15</a:t>
+            </a:fld>
+            <a:endParaRPr lang="en-US"/>
+          </a:p>
+        </p:txBody>
+      </p:sp>
+    </p:spTree>
+    <p:extLst>
+      <p:ext uri="{BB962C8B-B14F-4D97-AF65-F5344CB8AC3E}">
+        <p14:creationId xmlns:p14="http://schemas.microsoft.com/office/powerpoint/2010/main" val="147840720"/>
+      </p:ext>
+    </p:extLst>
+  </p:cSld>
+  <p:clrMapOvr>
+    <a:masterClrMapping/>
+  </p:clrMapOvr>
+</p:notes>
+</file>
+
+<file path=ppt/notesSlides/notesSlide8.xml><?xml version="1.0" encoding="utf-8"?>
+<p:notes xmlns:a="http://schemas.openxmlformats.org/drawingml/2006/main" xmlns:r="http://schemas.openxmlformats.org/officeDocument/2006/relationships" xmlns:p="http://schemas.openxmlformats.org/presentationml/2006/main">
+  <p:cSld>
+    <p:spTree>
+      <p:nvGrpSpPr>
+        <p:cNvPr id="1" name=""/>
+        <p:cNvGrpSpPr/>
+        <p:nvPr/>
+      </p:nvGrpSpPr>
+      <p:grpSpPr>
+        <a:xfrm>
+          <a:off x="0" y="0"/>
+          <a:ext cx="0" cy="0"/>
+          <a:chOff x="0" y="0"/>
+          <a:chExt cx="0" cy="0"/>
+        </a:xfrm>
+      </p:grpSpPr>
+      <p:sp>
+        <p:nvSpPr>
+          <p:cNvPr id="38914" name="Slide Image Placeholder 1"/>
+          <p:cNvSpPr>
+            <a:spLocks noGrp="1" noRot="1" noChangeAspect="1" noTextEdit="1"/>
+          </p:cNvSpPr>
+          <p:nvPr>
+            <p:ph type="sldImg"/>
+          </p:nvPr>
+        </p:nvSpPr>
+        <p:spPr bwMode="auto">
+          <a:noFill/>
+          <a:ln>
+            <a:solidFill>
+              <a:srgbClr val="000000"/>
+            </a:solidFill>
+            <a:miter lim="800000"/>
+            <a:headEnd/>
+            <a:tailEnd/>
+          </a:ln>
+        </p:spPr>
+      </p:sp>
+      <p:sp>
+        <p:nvSpPr>
+          <p:cNvPr id="38915" name="Notes Placeholder 2"/>
+          <p:cNvSpPr>
+            <a:spLocks noGrp="1"/>
+          </p:cNvSpPr>
+          <p:nvPr>
+            <p:ph type="body" idx="1"/>
+          </p:nvPr>
+        </p:nvSpPr>
+        <p:spPr>
+          <a:noFill/>
+          <a:ln/>
+        </p:spPr>
+        <p:txBody>
+          <a:bodyPr/>
+          <a:lstStyle/>
+          <a:p>
+            <a:r>
+              <a:rPr lang="en-US"/>
+              <a:t>Q: Have to move all the other elements up or down to make/use room.  O(n)</a:t>
+            </a:r>
+          </a:p>
+        </p:txBody>
+      </p:sp>
+      <p:sp>
+        <p:nvSpPr>
+          <p:cNvPr id="38916" name="Slide Number Placeholder 3"/>
+          <p:cNvSpPr>
+            <a:spLocks noGrp="1"/>
+          </p:cNvSpPr>
+          <p:nvPr>
+            <p:ph type="sldNum" sz="quarter" idx="5"/>
+          </p:nvPr>
+        </p:nvSpPr>
+        <p:spPr>
+          <a:noFill/>
+        </p:spPr>
+        <p:txBody>
+          <a:bodyPr/>
+          <a:lstStyle/>
+          <a:p>
+            <a:fld id="{44E6C81E-B2A6-437F-BF75-B7739F182E02}" type="slidenum">
+              <a:rPr lang="en-US" smtClean="0"/>
+              <a:pPr/>
+              <a:t>16</a:t>
+            </a:fld>
+            <a:endParaRPr lang="en-US"/>
+          </a:p>
+        </p:txBody>
+      </p:sp>
+    </p:spTree>
+    <p:extLst>
+      <p:ext uri="{BB962C8B-B14F-4D97-AF65-F5344CB8AC3E}">
+        <p14:creationId xmlns:p14="http://schemas.microsoft.com/office/powerpoint/2010/main" val="469131989"/>
+      </p:ext>
+    </p:extLst>
+  </p:cSld>
+  <p:clrMapOvr>
+    <a:masterClrMapping/>
+  </p:clrMapOvr>
+</p:notes>
+</file>
+
+<file path=ppt/notesSlides/notesSlide9.xml><?xml version="1.0" encoding="utf-8"?>
+<p:notes xmlns:a="http://schemas.openxmlformats.org/drawingml/2006/main" xmlns:r="http://schemas.openxmlformats.org/officeDocument/2006/relationships" xmlns:p="http://schemas.openxmlformats.org/presentationml/2006/main">
+  <p:cSld>
+    <p:spTree>
+      <p:nvGrpSpPr>
+        <p:cNvPr id="1" name=""/>
+        <p:cNvGrpSpPr/>
+        <p:nvPr/>
+      </p:nvGrpSpPr>
+      <p:grpSpPr>
+        <a:xfrm>
+          <a:off x="0" y="0"/>
+          <a:ext cx="0" cy="0"/>
+          <a:chOff x="0" y="0"/>
+          <a:chExt cx="0" cy="0"/>
+        </a:xfrm>
+      </p:grpSpPr>
+      <p:sp>
+        <p:nvSpPr>
+          <p:cNvPr id="38914" name="Slide Image Placeholder 1"/>
+          <p:cNvSpPr>
+            <a:spLocks noGrp="1" noRot="1" noChangeAspect="1" noTextEdit="1"/>
+          </p:cNvSpPr>
+          <p:nvPr>
+            <p:ph type="sldImg"/>
+          </p:nvPr>
+        </p:nvSpPr>
+        <p:spPr bwMode="auto">
+          <a:noFill/>
+          <a:ln>
+            <a:solidFill>
+              <a:srgbClr val="000000"/>
+            </a:solidFill>
+            <a:miter lim="800000"/>
+            <a:headEnd/>
+            <a:tailEnd/>
+          </a:ln>
+        </p:spPr>
+      </p:sp>
+      <p:sp>
+        <p:nvSpPr>
+          <p:cNvPr id="38915" name="Notes Placeholder 2"/>
+          <p:cNvSpPr>
+            <a:spLocks noGrp="1"/>
+          </p:cNvSpPr>
+          <p:nvPr>
+            <p:ph type="body" idx="1"/>
+          </p:nvPr>
+        </p:nvSpPr>
+        <p:spPr>
+          <a:noFill/>
+          <a:ln/>
+        </p:spPr>
+        <p:txBody>
+          <a:bodyPr/>
+          <a:lstStyle/>
+          <a:p>
+            <a:r>
+              <a:rPr lang="en-US"/>
+              <a:t>Q: Have to move all the other elements up or down to make/use room.  O(n)</a:t>
+            </a:r>
+          </a:p>
+        </p:txBody>
+      </p:sp>
+      <p:sp>
+        <p:nvSpPr>
+          <p:cNvPr id="38916" name="Slide Number Placeholder 3"/>
+          <p:cNvSpPr>
+            <a:spLocks noGrp="1"/>
+          </p:cNvSpPr>
+          <p:nvPr>
+            <p:ph type="sldNum" sz="quarter" idx="5"/>
+          </p:nvPr>
+        </p:nvSpPr>
+        <p:spPr>
+          <a:noFill/>
+        </p:spPr>
+        <p:txBody>
+          <a:bodyPr/>
+          <a:lstStyle/>
+          <a:p>
+            <a:fld id="{44E6C81E-B2A6-437F-BF75-B7739F182E02}" type="slidenum">
+              <a:rPr lang="en-US" smtClean="0"/>
+              <a:pPr/>
+              <a:t>17</a:t>
+            </a:fld>
+            <a:endParaRPr lang="en-US"/>
+          </a:p>
+        </p:txBody>
+      </p:sp>
+    </p:spTree>
+    <p:extLst>
+      <p:ext uri="{BB962C8B-B14F-4D97-AF65-F5344CB8AC3E}">
+        <p14:creationId xmlns:p14="http://schemas.microsoft.com/office/powerpoint/2010/main" val="2808565418"/>
       </p:ext>
     </p:extLst>
   </p:cSld>
@@ -1488,7 +2627,7 @@
               <a:pPr>
                 <a:defRPr/>
               </a:pPr>
-              <a:t>Friday, October 28, 2022</a:t>
+              <a:t>Monday, October 31, 2022</a:t>
             </a:fld>
             <a:endParaRPr lang="en-US"/>
           </a:p>
@@ -1671,7 +2810,7 @@
               <a:pPr>
                 <a:defRPr/>
               </a:pPr>
-              <a:t>Friday, October 28, 2022</a:t>
+              <a:t>Monday, October 31, 2022</a:t>
             </a:fld>
             <a:endParaRPr lang="en-US"/>
           </a:p>
@@ -1864,7 +3003,7 @@
               <a:pPr>
                 <a:defRPr/>
               </a:pPr>
-              <a:t>Friday, October 28, 2022</a:t>
+              <a:t>Monday, October 31, 2022</a:t>
             </a:fld>
             <a:endParaRPr lang="en-US"/>
           </a:p>
@@ -2047,7 +3186,7 @@
               <a:pPr>
                 <a:defRPr/>
               </a:pPr>
-              <a:t>Friday, October 28, 2022</a:t>
+              <a:t>Monday, October 31, 2022</a:t>
             </a:fld>
             <a:endParaRPr lang="en-US"/>
           </a:p>
@@ -2307,7 +3446,7 @@
               <a:pPr>
                 <a:defRPr/>
               </a:pPr>
-              <a:t>Friday, October 28, 2022</a:t>
+              <a:t>Monday, October 31, 2022</a:t>
             </a:fld>
             <a:endParaRPr lang="en-US"/>
           </a:p>
@@ -2607,7 +3746,7 @@
               <a:pPr>
                 <a:defRPr/>
               </a:pPr>
-              <a:t>Friday, October 28, 2022</a:t>
+              <a:t>Monday, October 31, 2022</a:t>
             </a:fld>
             <a:endParaRPr lang="en-US"/>
           </a:p>
@@ -3041,7 +4180,7 @@
               <a:pPr>
                 <a:defRPr/>
               </a:pPr>
-              <a:t>Friday, October 28, 2022</a:t>
+              <a:t>Monday, October 31, 2022</a:t>
             </a:fld>
             <a:endParaRPr lang="en-US"/>
           </a:p>
@@ -3173,7 +4312,7 @@
               <a:pPr>
                 <a:defRPr/>
               </a:pPr>
-              <a:t>Friday, October 28, 2022</a:t>
+              <a:t>Monday, October 31, 2022</a:t>
             </a:fld>
             <a:endParaRPr lang="en-US"/>
           </a:p>
@@ -3283,7 +4422,7 @@
               <a:pPr>
                 <a:defRPr/>
               </a:pPr>
-              <a:t>Friday, October 28, 2022</a:t>
+              <a:t>Monday, October 31, 2022</a:t>
             </a:fld>
             <a:endParaRPr lang="en-US"/>
           </a:p>
@@ -3573,7 +4712,7 @@
               <a:pPr>
                 <a:defRPr/>
               </a:pPr>
-              <a:t>Friday, October 28, 2022</a:t>
+              <a:t>Monday, October 31, 2022</a:t>
             </a:fld>
             <a:endParaRPr lang="en-US"/>
           </a:p>
@@ -3840,7 +4979,7 @@
               <a:pPr>
                 <a:defRPr/>
               </a:pPr>
-              <a:t>Friday, October 28, 2022</a:t>
+              <a:t>Monday, October 31, 2022</a:t>
             </a:fld>
             <a:endParaRPr lang="en-US"/>
           </a:p>
@@ -4066,7 +5205,7 @@
               <a:pPr>
                 <a:defRPr/>
               </a:pPr>
-              <a:t>Friday, October 28, 2022</a:t>
+              <a:t>Monday, October 31, 2022</a:t>
             </a:fld>
             <a:endParaRPr lang="en-US"/>
           </a:p>
@@ -5168,6 +6307,1308 @@
 </p:sld>
 </file>
 
+<file path=ppt/slides/slide13.xml><?xml version="1.0" encoding="utf-8"?>
+<p:sld xmlns:a="http://schemas.openxmlformats.org/drawingml/2006/main" xmlns:r="http://schemas.openxmlformats.org/officeDocument/2006/relationships" xmlns:p="http://schemas.openxmlformats.org/presentationml/2006/main">
+  <p:cSld>
+    <p:spTree>
+      <p:nvGrpSpPr>
+        <p:cNvPr id="1" name=""/>
+        <p:cNvGrpSpPr/>
+        <p:nvPr/>
+      </p:nvGrpSpPr>
+      <p:grpSpPr>
+        <a:xfrm>
+          <a:off x="0" y="0"/>
+          <a:ext cx="0" cy="0"/>
+          <a:chOff x="0" y="0"/>
+          <a:chExt cx="0" cy="0"/>
+        </a:xfrm>
+      </p:grpSpPr>
+      <p:sp>
+        <p:nvSpPr>
+          <p:cNvPr id="4" name="Title 3"/>
+          <p:cNvSpPr>
+            <a:spLocks noGrp="1"/>
+          </p:cNvSpPr>
+          <p:nvPr>
+            <p:ph type="title"/>
+          </p:nvPr>
+        </p:nvSpPr>
+        <p:spPr>
+          <a:xfrm>
+            <a:off x="638908" y="2667000"/>
+            <a:ext cx="7772400" cy="1362075"/>
+          </a:xfrm>
+        </p:spPr>
+        <p:txBody>
+          <a:bodyPr/>
+          <a:lstStyle/>
+          <a:p>
+            <a:pPr>
+              <a:defRPr/>
+            </a:pPr>
+            <a:r>
+              <a:rPr lang="en-US" dirty="0"/>
+              <a:t>Data Structures +</a:t>
+            </a:r>
+            <a:br>
+              <a:rPr lang="en-US" dirty="0"/>
+            </a:br>
+            <a:r>
+              <a:rPr lang="en-US" dirty="0" err="1"/>
+              <a:t>BiG</a:t>
+            </a:r>
+            <a:r>
+              <a:rPr lang="en-US" dirty="0"/>
+              <a:t>-O Notation</a:t>
+            </a:r>
+          </a:p>
+        </p:txBody>
+      </p:sp>
+      <p:sp>
+        <p:nvSpPr>
+          <p:cNvPr id="11267" name="Text Placeholder 4"/>
+          <p:cNvSpPr>
+            <a:spLocks noGrp="1"/>
+          </p:cNvSpPr>
+          <p:nvPr>
+            <p:ph type="body" idx="1"/>
+          </p:nvPr>
+        </p:nvSpPr>
+        <p:spPr/>
+        <p:txBody>
+          <a:bodyPr/>
+          <a:lstStyle/>
+          <a:p>
+            <a:r>
+              <a:rPr lang="en-US" dirty="0"/>
+              <a:t>Understanding the engineering trade-offs when storing data</a:t>
+            </a:r>
+          </a:p>
+        </p:txBody>
+      </p:sp>
+      <p:sp>
+        <p:nvSpPr>
+          <p:cNvPr id="5" name="Rectangle 1"/>
+          <p:cNvSpPr txBox="1">
+            <a:spLocks/>
+          </p:cNvSpPr>
+          <p:nvPr/>
+        </p:nvSpPr>
+        <p:spPr>
+          <a:xfrm>
+            <a:off x="2819400" y="1244600"/>
+            <a:ext cx="7772400" cy="1470025"/>
+          </a:xfrm>
+          <a:prstGeom prst="rect">
+            <a:avLst/>
+          </a:prstGeom>
+        </p:spPr>
+        <p:txBody>
+          <a:bodyPr vert="horz" lIns="91440" tIns="45720" rIns="91440" bIns="45720" rtlCol="0" anchor="t">
+            <a:normAutofit/>
+          </a:bodyPr>
+          <a:lstStyle>
+            <a:lvl1pPr algn="l" defTabSz="914400" rtl="0" eaLnBrk="1" latinLnBrk="0" hangingPunct="1">
+              <a:spcBef>
+                <a:spcPct val="0"/>
+              </a:spcBef>
+              <a:buNone/>
+              <a:defRPr sz="4000" b="1" kern="1200" cap="all">
+                <a:solidFill>
+                  <a:schemeClr val="tx1"/>
+                </a:solidFill>
+                <a:latin typeface="+mj-lt"/>
+                <a:ea typeface="+mj-ea"/>
+                <a:cs typeface="+mj-cs"/>
+              </a:defRPr>
+            </a:lvl1pPr>
+          </a:lstStyle>
+          <a:p>
+            <a:pPr fontAlgn="auto">
+              <a:spcAft>
+                <a:spcPts val="0"/>
+              </a:spcAft>
+              <a:defRPr/>
+            </a:pPr>
+            <a:r>
+              <a:rPr lang="en-US" dirty="0"/>
+              <a:t>CSSE 220</a:t>
+            </a:r>
+          </a:p>
+        </p:txBody>
+      </p:sp>
+      <p:sp>
+        <p:nvSpPr>
+          <p:cNvPr id="8" name="Rectangle 7">
+            <a:extLst>
+              <a:ext uri="{FF2B5EF4-FFF2-40B4-BE49-F238E27FC236}">
+                <a16:creationId xmlns:a16="http://schemas.microsoft.com/office/drawing/2014/main" id="{F73FC399-1E29-7D4B-85AF-66732E35E676}"/>
+              </a:ext>
+            </a:extLst>
+          </p:cNvPr>
+          <p:cNvSpPr/>
+          <p:nvPr/>
+        </p:nvSpPr>
+        <p:spPr>
+          <a:xfrm>
+            <a:off x="304800" y="5276850"/>
+            <a:ext cx="8534400" cy="1295400"/>
+          </a:xfrm>
+          <a:prstGeom prst="rect">
+            <a:avLst/>
+          </a:prstGeom>
+          <a:solidFill>
+            <a:schemeClr val="accent3"/>
+          </a:solidFill>
+        </p:spPr>
+        <p:style>
+          <a:lnRef idx="2">
+            <a:schemeClr val="accent3">
+              <a:shade val="50000"/>
+            </a:schemeClr>
+          </a:lnRef>
+          <a:fillRef idx="1">
+            <a:schemeClr val="accent3"/>
+          </a:fillRef>
+          <a:effectRef idx="0">
+            <a:schemeClr val="accent3"/>
+          </a:effectRef>
+          <a:fontRef idx="minor">
+            <a:schemeClr val="lt1"/>
+          </a:fontRef>
+        </p:style>
+        <p:txBody>
+          <a:bodyPr rtlCol="0" anchor="ctr"/>
+          <a:lstStyle/>
+          <a:p>
+            <a:r>
+              <a:rPr lang="en-US" sz="2400" dirty="0">
+                <a:solidFill>
+                  <a:srgbClr val="FFFFFF"/>
+                </a:solidFill>
+              </a:rPr>
+              <a:t>The </a:t>
+            </a:r>
+            <a:r>
+              <a:rPr lang="en-US" sz="2400" i="1" dirty="0">
+                <a:solidFill>
+                  <a:srgbClr val="FFFFFF"/>
+                </a:solidFill>
+              </a:rPr>
+              <a:t>git</a:t>
+            </a:r>
+            <a:r>
+              <a:rPr lang="en-US" sz="2400" dirty="0">
+                <a:solidFill>
+                  <a:srgbClr val="FFFFFF"/>
+                </a:solidFill>
+              </a:rPr>
+              <a:t> projects for today are:</a:t>
+            </a:r>
+          </a:p>
+          <a:p>
+            <a:pPr marL="342900" indent="-342900">
+              <a:buFont typeface="Arial" panose="020B0604020202020204" pitchFamily="34" charset="0"/>
+              <a:buChar char="•"/>
+            </a:pPr>
+            <a:r>
+              <a:rPr lang="en-US" sz="2400" i="1" dirty="0" err="1"/>
+              <a:t>PracticeLinkedListSimple</a:t>
+            </a:r>
+            <a:endParaRPr lang="en-US" sz="2400" i="1" dirty="0"/>
+          </a:p>
+          <a:p>
+            <a:pPr marL="342900" indent="-342900">
+              <a:buFont typeface="Arial" panose="020B0604020202020204" pitchFamily="34" charset="0"/>
+              <a:buChar char="•"/>
+            </a:pPr>
+            <a:r>
+              <a:rPr lang="en-US" sz="2400" i="1" dirty="0" err="1"/>
+              <a:t>PracticeLinkedListSimpleSolution</a:t>
+            </a:r>
+            <a:endParaRPr lang="en-US" sz="2400" i="1" dirty="0"/>
+          </a:p>
+        </p:txBody>
+      </p:sp>
+      <p:pic>
+        <p:nvPicPr>
+          <p:cNvPr id="9" name="Picture 8">
+            <a:extLst>
+              <a:ext uri="{FF2B5EF4-FFF2-40B4-BE49-F238E27FC236}">
+                <a16:creationId xmlns:a16="http://schemas.microsoft.com/office/drawing/2014/main" id="{A8AE3E50-A240-80D8-A78D-A7D1D25A2917}"/>
+              </a:ext>
+            </a:extLst>
+          </p:cNvPr>
+          <p:cNvPicPr>
+            <a:picLocks noChangeAspect="1"/>
+          </p:cNvPicPr>
+          <p:nvPr/>
+        </p:nvPicPr>
+        <p:blipFill>
+          <a:blip r:embed="rId3"/>
+          <a:stretch>
+            <a:fillRect/>
+          </a:stretch>
+        </p:blipFill>
+        <p:spPr>
+          <a:xfrm>
+            <a:off x="5937409" y="1015626"/>
+            <a:ext cx="2816626" cy="2439173"/>
+          </a:xfrm>
+          <a:prstGeom prst="rect">
+            <a:avLst/>
+          </a:prstGeom>
+        </p:spPr>
+      </p:pic>
+    </p:spTree>
+  </p:cSld>
+  <p:clrMapOvr>
+    <a:masterClrMapping/>
+  </p:clrMapOvr>
+</p:sld>
+</file>
+
+<file path=ppt/slides/slide14.xml><?xml version="1.0" encoding="utf-8"?>
+<p:sld xmlns:a="http://schemas.openxmlformats.org/drawingml/2006/main" xmlns:r="http://schemas.openxmlformats.org/officeDocument/2006/relationships" xmlns:p="http://schemas.openxmlformats.org/presentationml/2006/main">
+  <p:cSld>
+    <p:spTree>
+      <p:nvGrpSpPr>
+        <p:cNvPr id="1" name=""/>
+        <p:cNvGrpSpPr/>
+        <p:nvPr/>
+      </p:nvGrpSpPr>
+      <p:grpSpPr>
+        <a:xfrm>
+          <a:off x="0" y="0"/>
+          <a:ext cx="0" cy="0"/>
+          <a:chOff x="0" y="0"/>
+          <a:chExt cx="0" cy="0"/>
+        </a:xfrm>
+      </p:grpSpPr>
+      <p:sp>
+        <p:nvSpPr>
+          <p:cNvPr id="4" name="Title 3"/>
+          <p:cNvSpPr>
+            <a:spLocks noGrp="1"/>
+          </p:cNvSpPr>
+          <p:nvPr>
+            <p:ph type="title"/>
+          </p:nvPr>
+        </p:nvSpPr>
+        <p:spPr/>
+        <p:txBody>
+          <a:bodyPr/>
+          <a:lstStyle/>
+          <a:p>
+            <a:pPr>
+              <a:defRPr/>
+            </a:pPr>
+            <a:r>
+              <a:rPr lang="en-US"/>
+              <a:t>Data Structures</a:t>
+            </a:r>
+          </a:p>
+        </p:txBody>
+      </p:sp>
+      <p:sp>
+        <p:nvSpPr>
+          <p:cNvPr id="12290" name="Content Placeholder 4"/>
+          <p:cNvSpPr>
+            <a:spLocks noGrp="1"/>
+          </p:cNvSpPr>
+          <p:nvPr>
+            <p:ph idx="1"/>
+          </p:nvPr>
+        </p:nvSpPr>
+        <p:spPr>
+          <a:xfrm>
+            <a:off x="457200" y="1240972"/>
+            <a:ext cx="8229600" cy="4885192"/>
+          </a:xfrm>
+        </p:spPr>
+        <p:txBody>
+          <a:bodyPr>
+            <a:normAutofit/>
+          </a:bodyPr>
+          <a:lstStyle/>
+          <a:p>
+            <a:r>
+              <a:rPr lang="en-US" dirty="0"/>
+              <a:t>We need efficient ways to store data </a:t>
+            </a:r>
+            <a:r>
+              <a:rPr lang="en-US" b="1" dirty="0"/>
+              <a:t>based on how we’ll use it</a:t>
+            </a:r>
+          </a:p>
+          <a:p>
+            <a:r>
+              <a:rPr lang="en-US" dirty="0"/>
+              <a:t>"How we'll use it" = algorithms used to access/update data stored in the data structure</a:t>
+            </a:r>
+          </a:p>
+          <a:p>
+            <a:endParaRPr lang="en-US" dirty="0"/>
+          </a:p>
+          <a:p>
+            <a:r>
+              <a:rPr lang="en-US" dirty="0"/>
+              <a:t>The main theme for the rest of the course</a:t>
+            </a:r>
+          </a:p>
+          <a:p>
+            <a:pPr marL="0" indent="0">
+              <a:buNone/>
+            </a:pPr>
+            <a:endParaRPr lang="en-US" dirty="0"/>
+          </a:p>
+        </p:txBody>
+      </p:sp>
+    </p:spTree>
+  </p:cSld>
+  <p:clrMapOvr>
+    <a:masterClrMapping/>
+  </p:clrMapOvr>
+</p:sld>
+</file>
+
+<file path=ppt/slides/slide15.xml><?xml version="1.0" encoding="utf-8"?>
+<p:sld xmlns:a="http://schemas.openxmlformats.org/drawingml/2006/main" xmlns:r="http://schemas.openxmlformats.org/officeDocument/2006/relationships" xmlns:p="http://schemas.openxmlformats.org/presentationml/2006/main">
+  <p:cSld>
+    <p:spTree>
+      <p:nvGrpSpPr>
+        <p:cNvPr id="1" name=""/>
+        <p:cNvGrpSpPr/>
+        <p:nvPr/>
+      </p:nvGrpSpPr>
+      <p:grpSpPr>
+        <a:xfrm>
+          <a:off x="0" y="0"/>
+          <a:ext cx="0" cy="0"/>
+          <a:chOff x="0" y="0"/>
+          <a:chExt cx="0" cy="0"/>
+        </a:xfrm>
+      </p:grpSpPr>
+      <p:sp>
+        <p:nvSpPr>
+          <p:cNvPr id="4" name="Title 3"/>
+          <p:cNvSpPr>
+            <a:spLocks noGrp="1"/>
+          </p:cNvSpPr>
+          <p:nvPr>
+            <p:ph type="title"/>
+          </p:nvPr>
+        </p:nvSpPr>
+        <p:spPr>
+          <a:xfrm>
+            <a:off x="500742" y="78695"/>
+            <a:ext cx="8229600" cy="1143000"/>
+          </a:xfrm>
+        </p:spPr>
+        <p:txBody>
+          <a:bodyPr/>
+          <a:lstStyle/>
+          <a:p>
+            <a:pPr>
+              <a:defRPr/>
+            </a:pPr>
+            <a:r>
+              <a:rPr lang="en-US" dirty="0" err="1"/>
+              <a:t>ArrayList</a:t>
+            </a:r>
+            <a:r>
+              <a:rPr lang="en-US" dirty="0"/>
+              <a:t> Data Structure in Java</a:t>
+            </a:r>
+          </a:p>
+        </p:txBody>
+      </p:sp>
+      <p:sp>
+        <p:nvSpPr>
+          <p:cNvPr id="12290" name="Content Placeholder 4"/>
+          <p:cNvSpPr>
+            <a:spLocks noGrp="1"/>
+          </p:cNvSpPr>
+          <p:nvPr>
+            <p:ph idx="1"/>
+          </p:nvPr>
+        </p:nvSpPr>
+        <p:spPr>
+          <a:xfrm>
+            <a:off x="424543" y="914400"/>
+            <a:ext cx="8229600" cy="4885192"/>
+          </a:xfrm>
+        </p:spPr>
+        <p:txBody>
+          <a:bodyPr>
+            <a:normAutofit/>
+          </a:bodyPr>
+          <a:lstStyle/>
+          <a:p>
+            <a:pPr lvl="1"/>
+            <a:r>
+              <a:rPr lang="en-US" dirty="0"/>
+              <a:t>Fast addition </a:t>
+            </a:r>
+            <a:r>
+              <a:rPr lang="en-US" b="1" dirty="0"/>
+              <a:t>to end of list</a:t>
+            </a:r>
+            <a:br>
+              <a:rPr lang="en-US" b="1" dirty="0"/>
+            </a:br>
+            <a:r>
+              <a:rPr lang="en-US" sz="2400" dirty="0"/>
+              <a:t>Requires 1 multiplication and 1 addition to compute address</a:t>
+            </a:r>
+            <a:endParaRPr lang="en-US" sz="2400" b="1" dirty="0"/>
+          </a:p>
+        </p:txBody>
+      </p:sp>
+      <p:pic>
+        <p:nvPicPr>
+          <p:cNvPr id="3" name="Picture 2" descr="Graphical user interface&#10;&#10;Description automatically generated with medium confidence">
+            <a:extLst>
+              <a:ext uri="{FF2B5EF4-FFF2-40B4-BE49-F238E27FC236}">
+                <a16:creationId xmlns:a16="http://schemas.microsoft.com/office/drawing/2014/main" id="{63700C4F-FFD7-4B45-A727-EEC331387E3B}"/>
+              </a:ext>
+            </a:extLst>
+          </p:cNvPr>
+          <p:cNvPicPr>
+            <a:picLocks noChangeAspect="1"/>
+          </p:cNvPicPr>
+          <p:nvPr/>
+        </p:nvPicPr>
+        <p:blipFill>
+          <a:blip r:embed="rId3">
+            <a:extLst>
+              <a:ext uri="{28A0092B-C50C-407E-A947-70E740481C1C}">
+                <a14:useLocalDpi xmlns:a14="http://schemas.microsoft.com/office/drawing/2010/main" val="0"/>
+              </a:ext>
+            </a:extLst>
+          </a:blip>
+          <a:stretch>
+            <a:fillRect/>
+          </a:stretch>
+        </p:blipFill>
+        <p:spPr>
+          <a:xfrm>
+            <a:off x="1208314" y="2081147"/>
+            <a:ext cx="5334000" cy="4544375"/>
+          </a:xfrm>
+          <a:prstGeom prst="rect">
+            <a:avLst/>
+          </a:prstGeom>
+        </p:spPr>
+      </p:pic>
+      <p:sp>
+        <p:nvSpPr>
+          <p:cNvPr id="5" name="Freeform 4">
+            <a:extLst>
+              <a:ext uri="{FF2B5EF4-FFF2-40B4-BE49-F238E27FC236}">
+                <a16:creationId xmlns:a16="http://schemas.microsoft.com/office/drawing/2014/main" id="{C9801F98-9AB0-CA48-86A9-2B6F511A3F82}"/>
+              </a:ext>
+            </a:extLst>
+          </p:cNvPr>
+          <p:cNvSpPr/>
+          <p:nvPr/>
+        </p:nvSpPr>
+        <p:spPr>
+          <a:xfrm>
+            <a:off x="5516217" y="1600200"/>
+            <a:ext cx="2915790" cy="4104861"/>
+          </a:xfrm>
+          <a:custGeom>
+            <a:avLst/>
+            <a:gdLst>
+              <a:gd name="connsiteX0" fmla="*/ 2266122 w 2915790"/>
+              <a:gd name="connsiteY0" fmla="*/ 0 h 4104861"/>
+              <a:gd name="connsiteX1" fmla="*/ 2773018 w 2915790"/>
+              <a:gd name="connsiteY1" fmla="*/ 2763078 h 4104861"/>
+              <a:gd name="connsiteX2" fmla="*/ 0 w 2915790"/>
+              <a:gd name="connsiteY2" fmla="*/ 4104861 h 4104861"/>
+            </a:gdLst>
+            <a:ahLst/>
+            <a:cxnLst>
+              <a:cxn ang="0">
+                <a:pos x="connsiteX0" y="connsiteY0"/>
+              </a:cxn>
+              <a:cxn ang="0">
+                <a:pos x="connsiteX1" y="connsiteY1"/>
+              </a:cxn>
+              <a:cxn ang="0">
+                <a:pos x="connsiteX2" y="connsiteY2"/>
+              </a:cxn>
+            </a:cxnLst>
+            <a:rect l="l" t="t" r="r" b="b"/>
+            <a:pathLst>
+              <a:path w="2915790" h="4104861">
+                <a:moveTo>
+                  <a:pt x="2266122" y="0"/>
+                </a:moveTo>
+                <a:cubicBezTo>
+                  <a:pt x="2708413" y="1039467"/>
+                  <a:pt x="3150705" y="2078935"/>
+                  <a:pt x="2773018" y="2763078"/>
+                </a:cubicBezTo>
+                <a:cubicBezTo>
+                  <a:pt x="2395331" y="3447221"/>
+                  <a:pt x="1197665" y="3776041"/>
+                  <a:pt x="0" y="4104861"/>
+                </a:cubicBezTo>
+              </a:path>
+            </a:pathLst>
+          </a:custGeom>
+          <a:noFill/>
+          <a:ln>
+            <a:solidFill>
+              <a:srgbClr val="C00000"/>
+            </a:solidFill>
+            <a:headEnd type="none" w="med" len="med"/>
+            <a:tailEnd type="arrow" w="med" len="med"/>
+          </a:ln>
+        </p:spPr>
+        <p:style>
+          <a:lnRef idx="2">
+            <a:schemeClr val="accent1">
+              <a:shade val="50000"/>
+            </a:schemeClr>
+          </a:lnRef>
+          <a:fillRef idx="1">
+            <a:schemeClr val="accent1"/>
+          </a:fillRef>
+          <a:effectRef idx="0">
+            <a:schemeClr val="accent1"/>
+          </a:effectRef>
+          <a:fontRef idx="minor">
+            <a:schemeClr val="lt1"/>
+          </a:fontRef>
+        </p:style>
+        <p:txBody>
+          <a:bodyPr rtlCol="0" anchor="ctr"/>
+          <a:lstStyle/>
+          <a:p>
+            <a:pPr algn="ctr"/>
+            <a:endParaRPr lang="en-US"/>
+          </a:p>
+        </p:txBody>
+      </p:sp>
+    </p:spTree>
+    <p:extLst>
+      <p:ext uri="{BB962C8B-B14F-4D97-AF65-F5344CB8AC3E}">
+        <p14:creationId xmlns:p14="http://schemas.microsoft.com/office/powerpoint/2010/main" val="627166366"/>
+      </p:ext>
+    </p:extLst>
+  </p:cSld>
+  <p:clrMapOvr>
+    <a:masterClrMapping/>
+  </p:clrMapOvr>
+</p:sld>
+</file>
+
+<file path=ppt/slides/slide16.xml><?xml version="1.0" encoding="utf-8"?>
+<p:sld xmlns:a="http://schemas.openxmlformats.org/drawingml/2006/main" xmlns:r="http://schemas.openxmlformats.org/officeDocument/2006/relationships" xmlns:p="http://schemas.openxmlformats.org/presentationml/2006/main">
+  <p:cSld>
+    <p:spTree>
+      <p:nvGrpSpPr>
+        <p:cNvPr id="1" name=""/>
+        <p:cNvGrpSpPr/>
+        <p:nvPr/>
+      </p:nvGrpSpPr>
+      <p:grpSpPr>
+        <a:xfrm>
+          <a:off x="0" y="0"/>
+          <a:ext cx="0" cy="0"/>
+          <a:chOff x="0" y="0"/>
+          <a:chExt cx="0" cy="0"/>
+        </a:xfrm>
+      </p:grpSpPr>
+      <p:sp>
+        <p:nvSpPr>
+          <p:cNvPr id="4" name="Title 3"/>
+          <p:cNvSpPr>
+            <a:spLocks noGrp="1"/>
+          </p:cNvSpPr>
+          <p:nvPr>
+            <p:ph type="title"/>
+          </p:nvPr>
+        </p:nvSpPr>
+        <p:spPr>
+          <a:xfrm>
+            <a:off x="500742" y="78695"/>
+            <a:ext cx="8229600" cy="1143000"/>
+          </a:xfrm>
+        </p:spPr>
+        <p:txBody>
+          <a:bodyPr/>
+          <a:lstStyle/>
+          <a:p>
+            <a:pPr>
+              <a:defRPr/>
+            </a:pPr>
+            <a:r>
+              <a:rPr lang="en-US" dirty="0" err="1"/>
+              <a:t>ArrayList</a:t>
+            </a:r>
+            <a:r>
+              <a:rPr lang="en-US" dirty="0"/>
+              <a:t> Data Structure in Java</a:t>
+            </a:r>
+          </a:p>
+        </p:txBody>
+      </p:sp>
+      <p:sp>
+        <p:nvSpPr>
+          <p:cNvPr id="12290" name="Content Placeholder 4"/>
+          <p:cNvSpPr>
+            <a:spLocks noGrp="1"/>
+          </p:cNvSpPr>
+          <p:nvPr>
+            <p:ph idx="1"/>
+          </p:nvPr>
+        </p:nvSpPr>
+        <p:spPr>
+          <a:xfrm>
+            <a:off x="424543" y="914400"/>
+            <a:ext cx="8229600" cy="4885192"/>
+          </a:xfrm>
+        </p:spPr>
+        <p:txBody>
+          <a:bodyPr>
+            <a:normAutofit/>
+          </a:bodyPr>
+          <a:lstStyle/>
+          <a:p>
+            <a:pPr lvl="1"/>
+            <a:r>
+              <a:rPr lang="en-US" dirty="0"/>
+              <a:t>Fast access to any existing position</a:t>
+            </a:r>
+            <a:br>
+              <a:rPr lang="en-US" b="1" dirty="0"/>
+            </a:br>
+            <a:r>
+              <a:rPr lang="en-US" sz="2400" dirty="0"/>
+              <a:t>Requires 1 multiplication and 1 addition to compute address</a:t>
+            </a:r>
+            <a:endParaRPr lang="en-US" sz="2400" b="1" dirty="0"/>
+          </a:p>
+        </p:txBody>
+      </p:sp>
+      <p:pic>
+        <p:nvPicPr>
+          <p:cNvPr id="6" name="Picture 5" descr="Diagram&#10;&#10;Description automatically generated">
+            <a:extLst>
+              <a:ext uri="{FF2B5EF4-FFF2-40B4-BE49-F238E27FC236}">
+                <a16:creationId xmlns:a16="http://schemas.microsoft.com/office/drawing/2014/main" id="{FDC82C5D-D934-754F-BC72-F68CA9C4CD44}"/>
+              </a:ext>
+            </a:extLst>
+          </p:cNvPr>
+          <p:cNvPicPr>
+            <a:picLocks noChangeAspect="1"/>
+          </p:cNvPicPr>
+          <p:nvPr/>
+        </p:nvPicPr>
+        <p:blipFill>
+          <a:blip r:embed="rId3">
+            <a:extLst>
+              <a:ext uri="{28A0092B-C50C-407E-A947-70E740481C1C}">
+                <a14:useLocalDpi xmlns:a14="http://schemas.microsoft.com/office/drawing/2010/main" val="0"/>
+              </a:ext>
+            </a:extLst>
+          </a:blip>
+          <a:stretch>
+            <a:fillRect/>
+          </a:stretch>
+        </p:blipFill>
+        <p:spPr>
+          <a:xfrm>
+            <a:off x="576468" y="2279586"/>
+            <a:ext cx="6817691" cy="3877153"/>
+          </a:xfrm>
+          <a:prstGeom prst="rect">
+            <a:avLst/>
+          </a:prstGeom>
+        </p:spPr>
+      </p:pic>
+      <p:sp>
+        <p:nvSpPr>
+          <p:cNvPr id="7" name="Freeform 6">
+            <a:extLst>
+              <a:ext uri="{FF2B5EF4-FFF2-40B4-BE49-F238E27FC236}">
+                <a16:creationId xmlns:a16="http://schemas.microsoft.com/office/drawing/2014/main" id="{BC15A584-A2CF-6543-9B04-88A074B507DD}"/>
+              </a:ext>
+            </a:extLst>
+          </p:cNvPr>
+          <p:cNvSpPr/>
+          <p:nvPr/>
+        </p:nvSpPr>
+        <p:spPr>
+          <a:xfrm>
+            <a:off x="6291470" y="1425450"/>
+            <a:ext cx="2248433" cy="3504359"/>
+          </a:xfrm>
+          <a:custGeom>
+            <a:avLst/>
+            <a:gdLst>
+              <a:gd name="connsiteX0" fmla="*/ 1500808 w 2248433"/>
+              <a:gd name="connsiteY0" fmla="*/ 174750 h 3504359"/>
+              <a:gd name="connsiteX1" fmla="*/ 2236304 w 2248433"/>
+              <a:gd name="connsiteY1" fmla="*/ 254263 h 3504359"/>
+              <a:gd name="connsiteX2" fmla="*/ 1808921 w 2248433"/>
+              <a:gd name="connsiteY2" fmla="*/ 2609837 h 3504359"/>
+              <a:gd name="connsiteX3" fmla="*/ 0 w 2248433"/>
+              <a:gd name="connsiteY3" fmla="*/ 3504359 h 3504359"/>
+            </a:gdLst>
+            <a:ahLst/>
+            <a:cxnLst>
+              <a:cxn ang="0">
+                <a:pos x="connsiteX0" y="connsiteY0"/>
+              </a:cxn>
+              <a:cxn ang="0">
+                <a:pos x="connsiteX1" y="connsiteY1"/>
+              </a:cxn>
+              <a:cxn ang="0">
+                <a:pos x="connsiteX2" y="connsiteY2"/>
+              </a:cxn>
+              <a:cxn ang="0">
+                <a:pos x="connsiteX3" y="connsiteY3"/>
+              </a:cxn>
+            </a:cxnLst>
+            <a:rect l="l" t="t" r="r" b="b"/>
+            <a:pathLst>
+              <a:path w="2248433" h="3504359">
+                <a:moveTo>
+                  <a:pt x="1500808" y="174750"/>
+                </a:moveTo>
+                <a:cubicBezTo>
+                  <a:pt x="1842880" y="11582"/>
+                  <a:pt x="2184952" y="-151585"/>
+                  <a:pt x="2236304" y="254263"/>
+                </a:cubicBezTo>
+                <a:cubicBezTo>
+                  <a:pt x="2287656" y="660111"/>
+                  <a:pt x="2181638" y="2068154"/>
+                  <a:pt x="1808921" y="2609837"/>
+                </a:cubicBezTo>
+                <a:cubicBezTo>
+                  <a:pt x="1436204" y="3151520"/>
+                  <a:pt x="718102" y="3327939"/>
+                  <a:pt x="0" y="3504359"/>
+                </a:cubicBezTo>
+              </a:path>
+            </a:pathLst>
+          </a:custGeom>
+          <a:noFill/>
+          <a:ln>
+            <a:solidFill>
+              <a:srgbClr val="C00000"/>
+            </a:solidFill>
+            <a:headEnd type="none" w="med" len="med"/>
+            <a:tailEnd type="arrow" w="med" len="med"/>
+          </a:ln>
+        </p:spPr>
+        <p:style>
+          <a:lnRef idx="2">
+            <a:schemeClr val="accent1">
+              <a:shade val="50000"/>
+            </a:schemeClr>
+          </a:lnRef>
+          <a:fillRef idx="1">
+            <a:schemeClr val="accent1"/>
+          </a:fillRef>
+          <a:effectRef idx="0">
+            <a:schemeClr val="accent1"/>
+          </a:effectRef>
+          <a:fontRef idx="minor">
+            <a:schemeClr val="lt1"/>
+          </a:fontRef>
+        </p:style>
+        <p:txBody>
+          <a:bodyPr rtlCol="0" anchor="ctr"/>
+          <a:lstStyle/>
+          <a:p>
+            <a:pPr algn="ctr"/>
+            <a:endParaRPr lang="en-US"/>
+          </a:p>
+        </p:txBody>
+      </p:sp>
+    </p:spTree>
+    <p:extLst>
+      <p:ext uri="{BB962C8B-B14F-4D97-AF65-F5344CB8AC3E}">
+        <p14:creationId xmlns:p14="http://schemas.microsoft.com/office/powerpoint/2010/main" val="2575321881"/>
+      </p:ext>
+    </p:extLst>
+  </p:cSld>
+  <p:clrMapOvr>
+    <a:masterClrMapping/>
+  </p:clrMapOvr>
+</p:sld>
+</file>
+
+<file path=ppt/slides/slide17.xml><?xml version="1.0" encoding="utf-8"?>
+<p:sld xmlns:a="http://schemas.openxmlformats.org/drawingml/2006/main" xmlns:r="http://schemas.openxmlformats.org/officeDocument/2006/relationships" xmlns:p="http://schemas.openxmlformats.org/presentationml/2006/main">
+  <p:cSld>
+    <p:spTree>
+      <p:nvGrpSpPr>
+        <p:cNvPr id="1" name=""/>
+        <p:cNvGrpSpPr/>
+        <p:nvPr/>
+      </p:nvGrpSpPr>
+      <p:grpSpPr>
+        <a:xfrm>
+          <a:off x="0" y="0"/>
+          <a:ext cx="0" cy="0"/>
+          <a:chOff x="0" y="0"/>
+          <a:chExt cx="0" cy="0"/>
+        </a:xfrm>
+      </p:grpSpPr>
+      <p:sp>
+        <p:nvSpPr>
+          <p:cNvPr id="4" name="Title 3"/>
+          <p:cNvSpPr>
+            <a:spLocks noGrp="1"/>
+          </p:cNvSpPr>
+          <p:nvPr>
+            <p:ph type="title"/>
+          </p:nvPr>
+        </p:nvSpPr>
+        <p:spPr>
+          <a:xfrm>
+            <a:off x="500742" y="78695"/>
+            <a:ext cx="8229600" cy="1143000"/>
+          </a:xfrm>
+        </p:spPr>
+        <p:txBody>
+          <a:bodyPr/>
+          <a:lstStyle/>
+          <a:p>
+            <a:pPr>
+              <a:defRPr/>
+            </a:pPr>
+            <a:r>
+              <a:rPr lang="en-US" dirty="0" err="1"/>
+              <a:t>ArrayList</a:t>
+            </a:r>
+            <a:r>
+              <a:rPr lang="en-US" dirty="0"/>
+              <a:t> Data Structure in Java</a:t>
+            </a:r>
+          </a:p>
+        </p:txBody>
+      </p:sp>
+      <p:sp>
+        <p:nvSpPr>
+          <p:cNvPr id="12290" name="Content Placeholder 4"/>
+          <p:cNvSpPr>
+            <a:spLocks noGrp="1"/>
+          </p:cNvSpPr>
+          <p:nvPr>
+            <p:ph idx="1"/>
+          </p:nvPr>
+        </p:nvSpPr>
+        <p:spPr>
+          <a:xfrm>
+            <a:off x="424543" y="914400"/>
+            <a:ext cx="8229600" cy="4885192"/>
+          </a:xfrm>
+        </p:spPr>
+        <p:txBody>
+          <a:bodyPr>
+            <a:normAutofit/>
+          </a:bodyPr>
+          <a:lstStyle/>
+          <a:p>
+            <a:pPr lvl="1"/>
+            <a:r>
+              <a:rPr lang="en-US" dirty="0"/>
+              <a:t>Slow inserts to and deletes from middle of list</a:t>
+            </a:r>
+            <a:br>
+              <a:rPr lang="en-US" b="1" dirty="0"/>
+            </a:br>
+            <a:endParaRPr lang="en-US" sz="2400" b="1" dirty="0"/>
+          </a:p>
+        </p:txBody>
+      </p:sp>
+      <p:pic>
+        <p:nvPicPr>
+          <p:cNvPr id="3" name="Picture 2" descr="Diagram&#10;&#10;Description automatically generated with medium confidence">
+            <a:extLst>
+              <a:ext uri="{FF2B5EF4-FFF2-40B4-BE49-F238E27FC236}">
+                <a16:creationId xmlns:a16="http://schemas.microsoft.com/office/drawing/2014/main" id="{FFDC3466-A7E9-9B4E-8E69-B0D42FE383C1}"/>
+              </a:ext>
+            </a:extLst>
+          </p:cNvPr>
+          <p:cNvPicPr>
+            <a:picLocks noChangeAspect="1"/>
+          </p:cNvPicPr>
+          <p:nvPr/>
+        </p:nvPicPr>
+        <p:blipFill>
+          <a:blip r:embed="rId3">
+            <a:extLst>
+              <a:ext uri="{28A0092B-C50C-407E-A947-70E740481C1C}">
+                <a14:useLocalDpi xmlns:a14="http://schemas.microsoft.com/office/drawing/2010/main" val="0"/>
+              </a:ext>
+            </a:extLst>
+          </a:blip>
+          <a:stretch>
+            <a:fillRect/>
+          </a:stretch>
+        </p:blipFill>
+        <p:spPr>
+          <a:xfrm>
+            <a:off x="397289" y="1520963"/>
+            <a:ext cx="8369300" cy="4432300"/>
+          </a:xfrm>
+          <a:prstGeom prst="rect">
+            <a:avLst/>
+          </a:prstGeom>
+        </p:spPr>
+      </p:pic>
+    </p:spTree>
+    <p:extLst>
+      <p:ext uri="{BB962C8B-B14F-4D97-AF65-F5344CB8AC3E}">
+        <p14:creationId xmlns:p14="http://schemas.microsoft.com/office/powerpoint/2010/main" val="2710827089"/>
+      </p:ext>
+    </p:extLst>
+  </p:cSld>
+  <p:clrMapOvr>
+    <a:masterClrMapping/>
+  </p:clrMapOvr>
+</p:sld>
+</file>
+
+<file path=ppt/slides/slide18.xml><?xml version="1.0" encoding="utf-8"?>
+<p:sld xmlns:a="http://schemas.openxmlformats.org/drawingml/2006/main" xmlns:r="http://schemas.openxmlformats.org/officeDocument/2006/relationships" xmlns:p="http://schemas.openxmlformats.org/presentationml/2006/main">
+  <p:cSld>
+    <p:spTree>
+      <p:nvGrpSpPr>
+        <p:cNvPr id="1" name=""/>
+        <p:cNvGrpSpPr/>
+        <p:nvPr/>
+      </p:nvGrpSpPr>
+      <p:grpSpPr>
+        <a:xfrm>
+          <a:off x="0" y="0"/>
+          <a:ext cx="0" cy="0"/>
+          <a:chOff x="0" y="0"/>
+          <a:chExt cx="0" cy="0"/>
+        </a:xfrm>
+      </p:grpSpPr>
+      <p:sp>
+        <p:nvSpPr>
+          <p:cNvPr id="2" name="Title 1"/>
+          <p:cNvSpPr>
+            <a:spLocks noGrp="1"/>
+          </p:cNvSpPr>
+          <p:nvPr>
+            <p:ph type="title"/>
+          </p:nvPr>
+        </p:nvSpPr>
+        <p:spPr/>
+        <p:txBody>
+          <a:bodyPr/>
+          <a:lstStyle/>
+          <a:p>
+            <a:r>
+              <a:rPr lang="en-US" dirty="0"/>
+              <a:t>Big-O Notation</a:t>
+            </a:r>
+          </a:p>
+        </p:txBody>
+      </p:sp>
+      <p:sp>
+        <p:nvSpPr>
+          <p:cNvPr id="3" name="Content Placeholder 2"/>
+          <p:cNvSpPr>
+            <a:spLocks noGrp="1"/>
+          </p:cNvSpPr>
+          <p:nvPr>
+            <p:ph idx="1"/>
+          </p:nvPr>
+        </p:nvSpPr>
+        <p:spPr/>
+        <p:txBody>
+          <a:bodyPr/>
+          <a:lstStyle/>
+          <a:p>
+            <a:r>
+              <a:rPr lang="en-US" dirty="0"/>
+              <a:t>Describes the limiting behavior </a:t>
+            </a:r>
+          </a:p>
+          <a:p>
+            <a:pPr lvl="1"/>
+            <a:r>
+              <a:rPr lang="en-US" dirty="0"/>
+              <a:t>How slow it can possibly run?</a:t>
+            </a:r>
+          </a:p>
+          <a:p>
+            <a:pPr lvl="1"/>
+            <a:r>
+              <a:rPr lang="en-US" dirty="0"/>
+              <a:t>Describes the </a:t>
+            </a:r>
+            <a:r>
+              <a:rPr lang="en-US" u="sng" dirty="0"/>
+              <a:t>worst case</a:t>
+            </a:r>
+          </a:p>
+          <a:p>
+            <a:r>
+              <a:rPr lang="en-US" dirty="0"/>
+              <a:t>Used for Classifying Algorithm Efficiency</a:t>
+            </a:r>
+          </a:p>
+          <a:p>
+            <a:r>
+              <a:rPr lang="en-US" dirty="0"/>
+              <a:t>“O” for “Order”</a:t>
+            </a:r>
+          </a:p>
+          <a:p>
+            <a:pPr lvl="1"/>
+            <a:r>
+              <a:rPr lang="en-US" dirty="0"/>
+              <a:t>O(n) </a:t>
+            </a:r>
+            <a:r>
+              <a:rPr lang="en-US" dirty="0">
+                <a:sym typeface="Wingdings" panose="05000000000000000000" pitchFamily="2" charset="2"/>
+              </a:rPr>
+              <a:t> said as “Order n”</a:t>
+            </a:r>
+          </a:p>
+          <a:p>
+            <a:pPr lvl="1"/>
+            <a:r>
+              <a:rPr lang="en-US" dirty="0">
+                <a:sym typeface="Wingdings" panose="05000000000000000000" pitchFamily="2" charset="2"/>
+              </a:rPr>
+              <a:t>O(n^2)  said as “Order n-squared”</a:t>
+            </a:r>
+          </a:p>
+        </p:txBody>
+      </p:sp>
+    </p:spTree>
+    <p:extLst>
+      <p:ext uri="{BB962C8B-B14F-4D97-AF65-F5344CB8AC3E}">
+        <p14:creationId xmlns:p14="http://schemas.microsoft.com/office/powerpoint/2010/main" val="3916409691"/>
+      </p:ext>
+    </p:extLst>
+  </p:cSld>
+  <p:clrMapOvr>
+    <a:masterClrMapping/>
+  </p:clrMapOvr>
+</p:sld>
+</file>
+
+<file path=ppt/slides/slide19.xml><?xml version="1.0" encoding="utf-8"?>
+<p:sld xmlns:a="http://schemas.openxmlformats.org/drawingml/2006/main" xmlns:r="http://schemas.openxmlformats.org/officeDocument/2006/relationships" xmlns:p="http://schemas.openxmlformats.org/presentationml/2006/main">
+  <p:cSld>
+    <p:spTree>
+      <p:nvGrpSpPr>
+        <p:cNvPr id="1" name=""/>
+        <p:cNvGrpSpPr/>
+        <p:nvPr/>
+      </p:nvGrpSpPr>
+      <p:grpSpPr>
+        <a:xfrm>
+          <a:off x="0" y="0"/>
+          <a:ext cx="0" cy="0"/>
+          <a:chOff x="0" y="0"/>
+          <a:chExt cx="0" cy="0"/>
+        </a:xfrm>
+      </p:grpSpPr>
+      <p:sp>
+        <p:nvSpPr>
+          <p:cNvPr id="2" name="Title 1"/>
+          <p:cNvSpPr>
+            <a:spLocks noGrp="1"/>
+          </p:cNvSpPr>
+          <p:nvPr>
+            <p:ph type="title"/>
+          </p:nvPr>
+        </p:nvSpPr>
+        <p:spPr/>
+        <p:txBody>
+          <a:bodyPr/>
+          <a:lstStyle/>
+          <a:p>
+            <a:r>
+              <a:rPr lang="en-US" dirty="0"/>
+              <a:t>Big-O Notation (continued)</a:t>
+            </a:r>
+          </a:p>
+        </p:txBody>
+      </p:sp>
+      <p:sp>
+        <p:nvSpPr>
+          <p:cNvPr id="3" name="Content Placeholder 2"/>
+          <p:cNvSpPr>
+            <a:spLocks noGrp="1"/>
+          </p:cNvSpPr>
+          <p:nvPr>
+            <p:ph idx="1"/>
+          </p:nvPr>
+        </p:nvSpPr>
+        <p:spPr/>
+        <p:txBody>
+          <a:bodyPr/>
+          <a:lstStyle/>
+          <a:p>
+            <a:r>
+              <a:rPr lang="en-US" dirty="0"/>
+              <a:t>Don’t Care About Constants</a:t>
+            </a:r>
+          </a:p>
+          <a:p>
+            <a:pPr lvl="1"/>
+            <a:r>
+              <a:rPr lang="en-US" dirty="0"/>
+              <a:t>O(2n + 7) </a:t>
+            </a:r>
+            <a:r>
+              <a:rPr lang="en-US" dirty="0">
+                <a:sym typeface="Wingdings" panose="05000000000000000000" pitchFamily="2" charset="2"/>
+              </a:rPr>
+              <a:t> O(n)</a:t>
+            </a:r>
+          </a:p>
+          <a:p>
+            <a:r>
+              <a:rPr lang="en-US" dirty="0">
+                <a:sym typeface="Wingdings" panose="05000000000000000000" pitchFamily="2" charset="2"/>
+              </a:rPr>
+              <a:t>Don’t Care About Smaller Powers</a:t>
+            </a:r>
+          </a:p>
+          <a:p>
+            <a:pPr lvl="1"/>
+            <a:r>
+              <a:rPr lang="en-US" dirty="0">
+                <a:sym typeface="Wingdings" panose="05000000000000000000" pitchFamily="2" charset="2"/>
+              </a:rPr>
+              <a:t>O(6n^2 + 7n) O(n^2)</a:t>
+            </a:r>
+          </a:p>
+          <a:p>
+            <a:pPr lvl="1"/>
+            <a:r>
+              <a:rPr lang="en-US" dirty="0">
+                <a:sym typeface="Wingdings" panose="05000000000000000000" pitchFamily="2" charset="2"/>
+              </a:rPr>
+              <a:t>Algorithm grows asymptotically no faster than n^2</a:t>
+            </a:r>
+          </a:p>
+          <a:p>
+            <a:r>
+              <a:rPr lang="en-US" dirty="0"/>
+              <a:t>If constant value, we say O(1) </a:t>
+            </a:r>
+            <a:r>
+              <a:rPr lang="en-US" dirty="0">
+                <a:sym typeface="Wingdings" panose="05000000000000000000" pitchFamily="2" charset="2"/>
+              </a:rPr>
+              <a:t> </a:t>
+            </a:r>
+            <a:r>
+              <a:rPr lang="en-US" dirty="0"/>
+              <a:t>“Order 1”</a:t>
+            </a:r>
+          </a:p>
+          <a:p>
+            <a:pPr lvl="1"/>
+            <a:r>
+              <a:rPr lang="en-US" dirty="0"/>
+              <a:t>O(48) </a:t>
+            </a:r>
+            <a:r>
+              <a:rPr lang="en-US" dirty="0">
+                <a:sym typeface="Wingdings" panose="05000000000000000000" pitchFamily="2" charset="2"/>
+              </a:rPr>
+              <a:t> O(1)</a:t>
+            </a:r>
+          </a:p>
+          <a:p>
+            <a:endParaRPr lang="en-US" dirty="0"/>
+          </a:p>
+        </p:txBody>
+      </p:sp>
+      <p:sp>
+        <p:nvSpPr>
+          <p:cNvPr id="4" name="Rectangle 9"/>
+          <p:cNvSpPr>
+            <a:spLocks/>
+          </p:cNvSpPr>
+          <p:nvPr/>
+        </p:nvSpPr>
+        <p:spPr bwMode="auto">
+          <a:xfrm>
+            <a:off x="8432800" y="6334564"/>
+            <a:ext cx="558800" cy="419100"/>
+          </a:xfrm>
+          <a:prstGeom prst="rect">
+            <a:avLst/>
+          </a:prstGeom>
+          <a:ln>
+            <a:headEnd/>
+            <a:tailEnd/>
+          </a:ln>
+        </p:spPr>
+        <p:style>
+          <a:lnRef idx="2">
+            <a:schemeClr val="accent3">
+              <a:shade val="50000"/>
+            </a:schemeClr>
+          </a:lnRef>
+          <a:fillRef idx="1">
+            <a:schemeClr val="accent3"/>
+          </a:fillRef>
+          <a:effectRef idx="0">
+            <a:schemeClr val="accent3"/>
+          </a:effectRef>
+          <a:fontRef idx="minor">
+            <a:schemeClr val="lt1"/>
+          </a:fontRef>
+        </p:style>
+        <p:txBody>
+          <a:bodyPr lIns="0" tIns="0" rIns="0" bIns="0" anchor="ctr"/>
+          <a:lstStyle/>
+          <a:p>
+            <a:pPr algn="ctr">
+              <a:defRPr/>
+            </a:pPr>
+            <a:r>
+              <a:rPr lang="en-US" sz="1800" dirty="0">
+                <a:solidFill>
+                  <a:schemeClr val="bg1"/>
+                </a:solidFill>
+                <a:cs typeface="Arial" pitchFamily="34" charset="0"/>
+                <a:sym typeface="Arial" pitchFamily="34" charset="0"/>
+              </a:rPr>
+              <a:t>Q2</a:t>
+            </a:r>
+          </a:p>
+        </p:txBody>
+      </p:sp>
+    </p:spTree>
+    <p:extLst>
+      <p:ext uri="{BB962C8B-B14F-4D97-AF65-F5344CB8AC3E}">
+        <p14:creationId xmlns:p14="http://schemas.microsoft.com/office/powerpoint/2010/main" val="1074093599"/>
+      </p:ext>
+    </p:extLst>
+  </p:cSld>
+  <p:clrMapOvr>
+    <a:masterClrMapping/>
+  </p:clrMapOvr>
+</p:sld>
+</file>
+
 <file path=ppt/slides/slide2.xml><?xml version="1.0" encoding="utf-8"?>
 <p:sld xmlns:a="http://schemas.openxmlformats.org/drawingml/2006/main" xmlns:r="http://schemas.openxmlformats.org/officeDocument/2006/relationships" xmlns:p="http://schemas.openxmlformats.org/presentationml/2006/main">
   <p:cSld>
@@ -5502,6 +7943,1641 @@
     <p:extLst>
       <p:ext uri="{BB962C8B-B14F-4D97-AF65-F5344CB8AC3E}">
         <p14:creationId xmlns:p14="http://schemas.microsoft.com/office/powerpoint/2010/main" val="141368525"/>
+      </p:ext>
+    </p:extLst>
+  </p:cSld>
+  <p:clrMapOvr>
+    <a:masterClrMapping/>
+  </p:clrMapOvr>
+</p:sld>
+</file>
+
+<file path=ppt/slides/slide20.xml><?xml version="1.0" encoding="utf-8"?>
+<p:sld xmlns:a="http://schemas.openxmlformats.org/drawingml/2006/main" xmlns:r="http://schemas.openxmlformats.org/officeDocument/2006/relationships" xmlns:p="http://schemas.openxmlformats.org/presentationml/2006/main">
+  <p:cSld>
+    <p:spTree>
+      <p:nvGrpSpPr>
+        <p:cNvPr id="1" name=""/>
+        <p:cNvGrpSpPr/>
+        <p:nvPr/>
+      </p:nvGrpSpPr>
+      <p:grpSpPr>
+        <a:xfrm>
+          <a:off x="0" y="0"/>
+          <a:ext cx="0" cy="0"/>
+          <a:chOff x="0" y="0"/>
+          <a:chExt cx="0" cy="0"/>
+        </a:xfrm>
+      </p:grpSpPr>
+      <p:sp>
+        <p:nvSpPr>
+          <p:cNvPr id="2" name="Title 1"/>
+          <p:cNvSpPr>
+            <a:spLocks noGrp="1"/>
+          </p:cNvSpPr>
+          <p:nvPr>
+            <p:ph type="title"/>
+          </p:nvPr>
+        </p:nvSpPr>
+        <p:spPr>
+          <a:xfrm>
+            <a:off x="228601" y="116377"/>
+            <a:ext cx="8607667" cy="1485899"/>
+          </a:xfrm>
+        </p:spPr>
+        <p:txBody>
+          <a:bodyPr/>
+          <a:lstStyle/>
+          <a:p>
+            <a:r>
+              <a:rPr lang="en-US" err="1"/>
+              <a:t>ArrayList</a:t>
+            </a:r>
+            <a:r>
+              <a:rPr lang="en-US"/>
+              <a:t> Performance (Revisited)</a:t>
+            </a:r>
+          </a:p>
+        </p:txBody>
+      </p:sp>
+      <p:sp>
+        <p:nvSpPr>
+          <p:cNvPr id="3" name="Content Placeholder 2"/>
+          <p:cNvSpPr>
+            <a:spLocks noGrp="1"/>
+          </p:cNvSpPr>
+          <p:nvPr>
+            <p:ph idx="1"/>
+          </p:nvPr>
+        </p:nvSpPr>
+        <p:spPr>
+          <a:xfrm>
+            <a:off x="228600" y="1600200"/>
+            <a:ext cx="8610600" cy="4953000"/>
+          </a:xfrm>
+        </p:spPr>
+        <p:txBody>
+          <a:bodyPr>
+            <a:normAutofit/>
+          </a:bodyPr>
+          <a:lstStyle/>
+          <a:p>
+            <a:r>
+              <a:rPr lang="en-US" dirty="0"/>
+              <a:t>Fast addition to </a:t>
+            </a:r>
+            <a:r>
+              <a:rPr lang="en-US" b="1" dirty="0"/>
+              <a:t>end of list</a:t>
+            </a:r>
+            <a:r>
+              <a:rPr lang="en-US" dirty="0"/>
+              <a:t>:</a:t>
+            </a:r>
+          </a:p>
+          <a:p>
+            <a:pPr lvl="1"/>
+            <a:r>
+              <a:rPr lang="en-US" dirty="0"/>
+              <a:t>Fast access to any existing position – </a:t>
+            </a:r>
+            <a:r>
+              <a:rPr lang="en-US" dirty="0">
+                <a:highlight>
+                  <a:srgbClr val="FFFF00"/>
+                </a:highlight>
+              </a:rPr>
+              <a:t>O(1)</a:t>
+            </a:r>
+            <a:r>
+              <a:rPr lang="en-US" dirty="0"/>
+              <a:t> (like array) </a:t>
+            </a:r>
+          </a:p>
+          <a:p>
+            <a:pPr lvl="1"/>
+            <a:r>
+              <a:rPr lang="en-US" dirty="0"/>
+              <a:t>Keep extra </a:t>
+            </a:r>
+            <a:r>
+              <a:rPr lang="en-US" i="1" dirty="0"/>
+              <a:t>capacity </a:t>
+            </a:r>
+            <a:r>
+              <a:rPr lang="en-US" dirty="0"/>
+              <a:t>for list growth </a:t>
+            </a:r>
+          </a:p>
+          <a:p>
+            <a:pPr lvl="2"/>
+            <a:r>
+              <a:rPr lang="en-US" dirty="0"/>
+              <a:t>Fast access includes items in capacity not yet filled – </a:t>
+            </a:r>
+            <a:r>
+              <a:rPr lang="en-US" dirty="0">
+                <a:highlight>
+                  <a:srgbClr val="FFFF00"/>
+                </a:highlight>
+              </a:rPr>
+              <a:t>O(1)</a:t>
+            </a:r>
+          </a:p>
+          <a:p>
+            <a:pPr lvl="1"/>
+            <a:r>
+              <a:rPr lang="en-US" dirty="0"/>
+              <a:t>Capacity management is best left for CSSE230</a:t>
+            </a:r>
+          </a:p>
+          <a:p>
+            <a:r>
+              <a:rPr lang="en-US" dirty="0"/>
+              <a:t>Slow inserts to and deletes from middle of list</a:t>
+            </a:r>
+          </a:p>
+          <a:p>
+            <a:pPr lvl="1"/>
+            <a:r>
+              <a:rPr lang="en-US" dirty="0"/>
+              <a:t>Can get to insert/delete location quickly</a:t>
+            </a:r>
+          </a:p>
+          <a:p>
+            <a:pPr lvl="1"/>
+            <a:r>
+              <a:rPr lang="en-US" dirty="0"/>
+              <a:t>For insert, shift all items right to accommodate - </a:t>
+            </a:r>
+            <a:r>
+              <a:rPr lang="en-US" dirty="0">
+                <a:highlight>
+                  <a:srgbClr val="FFFF00"/>
+                </a:highlight>
+              </a:rPr>
+              <a:t>O(n)</a:t>
+            </a:r>
+          </a:p>
+          <a:p>
+            <a:pPr lvl="1"/>
+            <a:r>
+              <a:rPr lang="en-US" dirty="0"/>
+              <a:t>For delete, shift all items left to fill gap – </a:t>
+            </a:r>
+            <a:r>
+              <a:rPr lang="en-US" dirty="0">
+                <a:highlight>
+                  <a:srgbClr val="FFFF00"/>
+                </a:highlight>
+              </a:rPr>
+              <a:t>O(n)</a:t>
+            </a:r>
+          </a:p>
+          <a:p>
+            <a:pPr lvl="1"/>
+            <a:endParaRPr lang="en-US" i="1" dirty="0"/>
+          </a:p>
+        </p:txBody>
+      </p:sp>
+      <p:sp>
+        <p:nvSpPr>
+          <p:cNvPr id="4" name="Rectangle 9"/>
+          <p:cNvSpPr>
+            <a:spLocks/>
+          </p:cNvSpPr>
+          <p:nvPr/>
+        </p:nvSpPr>
+        <p:spPr bwMode="auto">
+          <a:xfrm>
+            <a:off x="8432800" y="6334564"/>
+            <a:ext cx="558800" cy="419100"/>
+          </a:xfrm>
+          <a:prstGeom prst="rect">
+            <a:avLst/>
+          </a:prstGeom>
+          <a:ln>
+            <a:headEnd/>
+            <a:tailEnd/>
+          </a:ln>
+        </p:spPr>
+        <p:style>
+          <a:lnRef idx="2">
+            <a:schemeClr val="accent3">
+              <a:shade val="50000"/>
+            </a:schemeClr>
+          </a:lnRef>
+          <a:fillRef idx="1">
+            <a:schemeClr val="accent3"/>
+          </a:fillRef>
+          <a:effectRef idx="0">
+            <a:schemeClr val="accent3"/>
+          </a:effectRef>
+          <a:fontRef idx="minor">
+            <a:schemeClr val="lt1"/>
+          </a:fontRef>
+        </p:style>
+        <p:txBody>
+          <a:bodyPr lIns="0" tIns="0" rIns="0" bIns="0" anchor="ctr"/>
+          <a:lstStyle/>
+          <a:p>
+            <a:pPr algn="ctr">
+              <a:defRPr/>
+            </a:pPr>
+            <a:r>
+              <a:rPr lang="en-US" sz="1800">
+                <a:solidFill>
+                  <a:schemeClr val="bg1"/>
+                </a:solidFill>
+                <a:cs typeface="Arial" pitchFamily="34" charset="0"/>
+                <a:sym typeface="Arial" pitchFamily="34" charset="0"/>
+              </a:rPr>
+              <a:t>Q3</a:t>
+            </a:r>
+          </a:p>
+        </p:txBody>
+      </p:sp>
+    </p:spTree>
+    <p:extLst>
+      <p:ext uri="{BB962C8B-B14F-4D97-AF65-F5344CB8AC3E}">
+        <p14:creationId xmlns:p14="http://schemas.microsoft.com/office/powerpoint/2010/main" val="3704871556"/>
+      </p:ext>
+    </p:extLst>
+  </p:cSld>
+  <p:clrMapOvr>
+    <a:masterClrMapping/>
+  </p:clrMapOvr>
+</p:sld>
+</file>
+
+<file path=ppt/slides/slide21.xml><?xml version="1.0" encoding="utf-8"?>
+<p:sld xmlns:a="http://schemas.openxmlformats.org/drawingml/2006/main" xmlns:r="http://schemas.openxmlformats.org/officeDocument/2006/relationships" xmlns:p="http://schemas.openxmlformats.org/presentationml/2006/main">
+  <p:cSld>
+    <p:spTree>
+      <p:nvGrpSpPr>
+        <p:cNvPr id="1" name=""/>
+        <p:cNvGrpSpPr/>
+        <p:nvPr/>
+      </p:nvGrpSpPr>
+      <p:grpSpPr>
+        <a:xfrm>
+          <a:off x="0" y="0"/>
+          <a:ext cx="0" cy="0"/>
+          <a:chOff x="0" y="0"/>
+          <a:chExt cx="0" cy="0"/>
+        </a:xfrm>
+      </p:grpSpPr>
+      <p:sp>
+        <p:nvSpPr>
+          <p:cNvPr id="3" name="Title 2"/>
+          <p:cNvSpPr>
+            <a:spLocks noGrp="1"/>
+          </p:cNvSpPr>
+          <p:nvPr>
+            <p:ph type="title"/>
+          </p:nvPr>
+        </p:nvSpPr>
+        <p:spPr/>
+        <p:txBody>
+          <a:bodyPr/>
+          <a:lstStyle/>
+          <a:p>
+            <a:pPr>
+              <a:defRPr/>
+            </a:pPr>
+            <a:r>
+              <a:rPr lang="en-US"/>
+              <a:t>Another List Data Structure</a:t>
+            </a:r>
+          </a:p>
+        </p:txBody>
+      </p:sp>
+      <p:sp>
+        <p:nvSpPr>
+          <p:cNvPr id="34818" name="Content Placeholder 1"/>
+          <p:cNvSpPr>
+            <a:spLocks noGrp="1"/>
+          </p:cNvSpPr>
+          <p:nvPr>
+            <p:ph idx="1"/>
+          </p:nvPr>
+        </p:nvSpPr>
+        <p:spPr/>
+        <p:txBody>
+          <a:bodyPr/>
+          <a:lstStyle/>
+          <a:p>
+            <a:r>
+              <a:rPr lang="en-US" dirty="0"/>
+              <a:t>What if we have to add/remove data from a list frequently?</a:t>
+            </a:r>
+          </a:p>
+          <a:p>
+            <a:r>
+              <a:rPr lang="en-US" dirty="0" err="1">
+                <a:latin typeface="Lucida Sans Typewriter" charset="0"/>
+              </a:rPr>
+              <a:t>LinkedLists</a:t>
+            </a:r>
+            <a:r>
+              <a:rPr lang="en-US" dirty="0"/>
+              <a:t> support this:</a:t>
+            </a:r>
+          </a:p>
+          <a:p>
+            <a:pPr lvl="1"/>
+            <a:r>
+              <a:rPr lang="en-US" dirty="0"/>
+              <a:t>Fast insertion and removal of elements </a:t>
+            </a:r>
+          </a:p>
+          <a:p>
+            <a:pPr lvl="2"/>
+            <a:r>
+              <a:rPr lang="en-US" dirty="0">
+                <a:highlight>
+                  <a:srgbClr val="FFFF00"/>
+                </a:highlight>
+              </a:rPr>
+              <a:t>Once we know where they go</a:t>
+            </a:r>
+          </a:p>
+          <a:p>
+            <a:pPr lvl="1"/>
+            <a:r>
+              <a:rPr lang="en-US" dirty="0"/>
+              <a:t>Slow access to arbitrary elements</a:t>
+            </a:r>
+          </a:p>
+          <a:p>
+            <a:pPr lvl="1"/>
+            <a:endParaRPr lang="en-US" dirty="0"/>
+          </a:p>
+          <a:p>
+            <a:pPr lvl="1"/>
+            <a:endParaRPr lang="en-US" dirty="0"/>
+          </a:p>
+          <a:p>
+            <a:pPr lvl="1">
+              <a:buFont typeface="Verdana" charset="0"/>
+              <a:buNone/>
+            </a:pPr>
+            <a:endParaRPr lang="en-US" dirty="0"/>
+          </a:p>
+        </p:txBody>
+      </p:sp>
+      <p:grpSp>
+        <p:nvGrpSpPr>
+          <p:cNvPr id="2" name="Group 1"/>
+          <p:cNvGrpSpPr/>
+          <p:nvPr/>
+        </p:nvGrpSpPr>
+        <p:grpSpPr>
+          <a:xfrm>
+            <a:off x="6601408" y="2404188"/>
+            <a:ext cx="2514600" cy="3771900"/>
+            <a:chOff x="6400799" y="2019300"/>
+            <a:chExt cx="2514600" cy="3771900"/>
+          </a:xfrm>
+        </p:grpSpPr>
+        <p:sp>
+          <p:nvSpPr>
+            <p:cNvPr id="5" name="Rectangle 4"/>
+            <p:cNvSpPr/>
+            <p:nvPr/>
+          </p:nvSpPr>
+          <p:spPr>
+            <a:xfrm>
+              <a:off x="7317591" y="2019300"/>
+              <a:ext cx="838200" cy="381000"/>
+            </a:xfrm>
+            <a:prstGeom prst="rect">
+              <a:avLst/>
+            </a:prstGeom>
+            <a:noFill/>
+            <a:ln w="38100"/>
+          </p:spPr>
+          <p:style>
+            <a:lnRef idx="2">
+              <a:schemeClr val="accent1">
+                <a:shade val="50000"/>
+              </a:schemeClr>
+            </a:lnRef>
+            <a:fillRef idx="1">
+              <a:schemeClr val="accent1"/>
+            </a:fillRef>
+            <a:effectRef idx="0">
+              <a:schemeClr val="accent1"/>
+            </a:effectRef>
+            <a:fontRef idx="minor">
+              <a:schemeClr val="lt1"/>
+            </a:fontRef>
+          </p:style>
+          <p:txBody>
+            <a:bodyPr rtlCol="0" anchor="ctr"/>
+            <a:lstStyle/>
+            <a:p>
+              <a:pPr algn="ctr"/>
+              <a:r>
+                <a:rPr lang="en-US">
+                  <a:solidFill>
+                    <a:srgbClr val="0070C0"/>
+                  </a:solidFill>
+                </a:rPr>
+                <a:t>data</a:t>
+              </a:r>
+            </a:p>
+          </p:txBody>
+        </p:sp>
+        <p:sp>
+          <p:nvSpPr>
+            <p:cNvPr id="6" name="Rectangle 5"/>
+            <p:cNvSpPr/>
+            <p:nvPr/>
+          </p:nvSpPr>
+          <p:spPr>
+            <a:xfrm>
+              <a:off x="6858000" y="3124200"/>
+              <a:ext cx="838200" cy="381000"/>
+            </a:xfrm>
+            <a:prstGeom prst="rect">
+              <a:avLst/>
+            </a:prstGeom>
+            <a:noFill/>
+            <a:ln w="38100"/>
+          </p:spPr>
+          <p:style>
+            <a:lnRef idx="2">
+              <a:schemeClr val="accent1">
+                <a:shade val="50000"/>
+              </a:schemeClr>
+            </a:lnRef>
+            <a:fillRef idx="1">
+              <a:schemeClr val="accent1"/>
+            </a:fillRef>
+            <a:effectRef idx="0">
+              <a:schemeClr val="accent1"/>
+            </a:effectRef>
+            <a:fontRef idx="minor">
+              <a:schemeClr val="lt1"/>
+            </a:fontRef>
+          </p:style>
+          <p:txBody>
+            <a:bodyPr rtlCol="0" anchor="ctr"/>
+            <a:lstStyle/>
+            <a:p>
+              <a:pPr algn="ctr"/>
+              <a:r>
+                <a:rPr lang="en-US">
+                  <a:solidFill>
+                    <a:srgbClr val="0070C0"/>
+                  </a:solidFill>
+                </a:rPr>
+                <a:t>data</a:t>
+              </a:r>
+            </a:p>
+          </p:txBody>
+        </p:sp>
+        <p:sp>
+          <p:nvSpPr>
+            <p:cNvPr id="7" name="Rectangle 6"/>
+            <p:cNvSpPr/>
+            <p:nvPr/>
+          </p:nvSpPr>
+          <p:spPr>
+            <a:xfrm>
+              <a:off x="8155791" y="2019300"/>
+              <a:ext cx="457200" cy="381000"/>
+            </a:xfrm>
+            <a:prstGeom prst="rect">
+              <a:avLst/>
+            </a:prstGeom>
+            <a:noFill/>
+            <a:ln w="38100"/>
+          </p:spPr>
+          <p:style>
+            <a:lnRef idx="2">
+              <a:schemeClr val="accent1">
+                <a:shade val="50000"/>
+              </a:schemeClr>
+            </a:lnRef>
+            <a:fillRef idx="1">
+              <a:schemeClr val="accent1"/>
+            </a:fillRef>
+            <a:effectRef idx="0">
+              <a:schemeClr val="accent1"/>
+            </a:effectRef>
+            <a:fontRef idx="minor">
+              <a:schemeClr val="lt1"/>
+            </a:fontRef>
+          </p:style>
+          <p:txBody>
+            <a:bodyPr rtlCol="0" anchor="ctr"/>
+            <a:lstStyle/>
+            <a:p>
+              <a:pPr algn="ctr"/>
+              <a:endParaRPr lang="en-US">
+                <a:solidFill>
+                  <a:srgbClr val="0070C0"/>
+                </a:solidFill>
+              </a:endParaRPr>
+            </a:p>
+          </p:txBody>
+        </p:sp>
+        <p:sp>
+          <p:nvSpPr>
+            <p:cNvPr id="8" name="Rectangle 7"/>
+            <p:cNvSpPr/>
+            <p:nvPr/>
+          </p:nvSpPr>
+          <p:spPr>
+            <a:xfrm>
+              <a:off x="7696200" y="3124200"/>
+              <a:ext cx="457200" cy="381000"/>
+            </a:xfrm>
+            <a:prstGeom prst="rect">
+              <a:avLst/>
+            </a:prstGeom>
+            <a:noFill/>
+            <a:ln w="38100"/>
+          </p:spPr>
+          <p:style>
+            <a:lnRef idx="2">
+              <a:schemeClr val="accent1">
+                <a:shade val="50000"/>
+              </a:schemeClr>
+            </a:lnRef>
+            <a:fillRef idx="1">
+              <a:schemeClr val="accent1"/>
+            </a:fillRef>
+            <a:effectRef idx="0">
+              <a:schemeClr val="accent1"/>
+            </a:effectRef>
+            <a:fontRef idx="minor">
+              <a:schemeClr val="lt1"/>
+            </a:fontRef>
+          </p:style>
+          <p:txBody>
+            <a:bodyPr rtlCol="0" anchor="ctr"/>
+            <a:lstStyle/>
+            <a:p>
+              <a:pPr algn="ctr"/>
+              <a:endParaRPr lang="en-US">
+                <a:solidFill>
+                  <a:srgbClr val="0070C0"/>
+                </a:solidFill>
+              </a:endParaRPr>
+            </a:p>
+          </p:txBody>
+        </p:sp>
+        <p:sp>
+          <p:nvSpPr>
+            <p:cNvPr id="9" name="Rectangle 8"/>
+            <p:cNvSpPr/>
+            <p:nvPr/>
+          </p:nvSpPr>
+          <p:spPr>
+            <a:xfrm>
+              <a:off x="6400800" y="3962400"/>
+              <a:ext cx="838200" cy="381000"/>
+            </a:xfrm>
+            <a:prstGeom prst="rect">
+              <a:avLst/>
+            </a:prstGeom>
+            <a:noFill/>
+            <a:ln w="38100"/>
+          </p:spPr>
+          <p:style>
+            <a:lnRef idx="2">
+              <a:schemeClr val="accent1">
+                <a:shade val="50000"/>
+              </a:schemeClr>
+            </a:lnRef>
+            <a:fillRef idx="1">
+              <a:schemeClr val="accent1"/>
+            </a:fillRef>
+            <a:effectRef idx="0">
+              <a:schemeClr val="accent1"/>
+            </a:effectRef>
+            <a:fontRef idx="minor">
+              <a:schemeClr val="lt1"/>
+            </a:fontRef>
+          </p:style>
+          <p:txBody>
+            <a:bodyPr rtlCol="0" anchor="ctr"/>
+            <a:lstStyle/>
+            <a:p>
+              <a:pPr algn="ctr"/>
+              <a:r>
+                <a:rPr lang="en-US">
+                  <a:solidFill>
+                    <a:srgbClr val="0070C0"/>
+                  </a:solidFill>
+                </a:rPr>
+                <a:t>data</a:t>
+              </a:r>
+            </a:p>
+          </p:txBody>
+        </p:sp>
+        <p:sp>
+          <p:nvSpPr>
+            <p:cNvPr id="10" name="Rectangle 9"/>
+            <p:cNvSpPr/>
+            <p:nvPr/>
+          </p:nvSpPr>
+          <p:spPr>
+            <a:xfrm>
+              <a:off x="7239000" y="3962400"/>
+              <a:ext cx="457200" cy="381000"/>
+            </a:xfrm>
+            <a:prstGeom prst="rect">
+              <a:avLst/>
+            </a:prstGeom>
+            <a:noFill/>
+            <a:ln w="38100"/>
+          </p:spPr>
+          <p:style>
+            <a:lnRef idx="2">
+              <a:schemeClr val="accent1">
+                <a:shade val="50000"/>
+              </a:schemeClr>
+            </a:lnRef>
+            <a:fillRef idx="1">
+              <a:schemeClr val="accent1"/>
+            </a:fillRef>
+            <a:effectRef idx="0">
+              <a:schemeClr val="accent1"/>
+            </a:effectRef>
+            <a:fontRef idx="minor">
+              <a:schemeClr val="lt1"/>
+            </a:fontRef>
+          </p:style>
+          <p:txBody>
+            <a:bodyPr rtlCol="0" anchor="ctr"/>
+            <a:lstStyle/>
+            <a:p>
+              <a:pPr algn="ctr"/>
+              <a:endParaRPr lang="en-US">
+                <a:solidFill>
+                  <a:srgbClr val="0070C0"/>
+                </a:solidFill>
+              </a:endParaRPr>
+            </a:p>
+          </p:txBody>
+        </p:sp>
+        <p:sp>
+          <p:nvSpPr>
+            <p:cNvPr id="11" name="Rectangle 10"/>
+            <p:cNvSpPr/>
+            <p:nvPr/>
+          </p:nvSpPr>
+          <p:spPr>
+            <a:xfrm>
+              <a:off x="6400799" y="5410200"/>
+              <a:ext cx="838200" cy="381000"/>
+            </a:xfrm>
+            <a:prstGeom prst="rect">
+              <a:avLst/>
+            </a:prstGeom>
+            <a:noFill/>
+            <a:ln w="38100"/>
+          </p:spPr>
+          <p:style>
+            <a:lnRef idx="2">
+              <a:schemeClr val="accent1">
+                <a:shade val="50000"/>
+              </a:schemeClr>
+            </a:lnRef>
+            <a:fillRef idx="1">
+              <a:schemeClr val="accent1"/>
+            </a:fillRef>
+            <a:effectRef idx="0">
+              <a:schemeClr val="accent1"/>
+            </a:effectRef>
+            <a:fontRef idx="minor">
+              <a:schemeClr val="lt1"/>
+            </a:fontRef>
+          </p:style>
+          <p:txBody>
+            <a:bodyPr rtlCol="0" anchor="ctr"/>
+            <a:lstStyle/>
+            <a:p>
+              <a:pPr algn="ctr"/>
+              <a:r>
+                <a:rPr lang="en-US">
+                  <a:solidFill>
+                    <a:srgbClr val="0070C0"/>
+                  </a:solidFill>
+                </a:rPr>
+                <a:t>data</a:t>
+              </a:r>
+            </a:p>
+          </p:txBody>
+        </p:sp>
+        <p:sp>
+          <p:nvSpPr>
+            <p:cNvPr id="12" name="Rectangle 11"/>
+            <p:cNvSpPr/>
+            <p:nvPr/>
+          </p:nvSpPr>
+          <p:spPr>
+            <a:xfrm>
+              <a:off x="7238999" y="5410200"/>
+              <a:ext cx="457200" cy="381000"/>
+            </a:xfrm>
+            <a:prstGeom prst="rect">
+              <a:avLst/>
+            </a:prstGeom>
+            <a:noFill/>
+            <a:ln w="38100"/>
+          </p:spPr>
+          <p:style>
+            <a:lnRef idx="2">
+              <a:schemeClr val="accent1">
+                <a:shade val="50000"/>
+              </a:schemeClr>
+            </a:lnRef>
+            <a:fillRef idx="1">
+              <a:schemeClr val="accent1"/>
+            </a:fillRef>
+            <a:effectRef idx="0">
+              <a:schemeClr val="accent1"/>
+            </a:effectRef>
+            <a:fontRef idx="minor">
+              <a:schemeClr val="lt1"/>
+            </a:fontRef>
+          </p:style>
+          <p:txBody>
+            <a:bodyPr rtlCol="0" anchor="ctr"/>
+            <a:lstStyle/>
+            <a:p>
+              <a:pPr algn="ctr"/>
+              <a:endParaRPr lang="en-US">
+                <a:solidFill>
+                  <a:srgbClr val="0070C0"/>
+                </a:solidFill>
+              </a:endParaRPr>
+            </a:p>
+          </p:txBody>
+        </p:sp>
+        <p:sp>
+          <p:nvSpPr>
+            <p:cNvPr id="13" name="Rectangle 12"/>
+            <p:cNvSpPr/>
+            <p:nvPr/>
+          </p:nvSpPr>
+          <p:spPr>
+            <a:xfrm>
+              <a:off x="7467599" y="4533899"/>
+              <a:ext cx="838200" cy="381000"/>
+            </a:xfrm>
+            <a:prstGeom prst="rect">
+              <a:avLst/>
+            </a:prstGeom>
+            <a:noFill/>
+            <a:ln w="38100"/>
+          </p:spPr>
+          <p:style>
+            <a:lnRef idx="2">
+              <a:schemeClr val="accent1">
+                <a:shade val="50000"/>
+              </a:schemeClr>
+            </a:lnRef>
+            <a:fillRef idx="1">
+              <a:schemeClr val="accent1"/>
+            </a:fillRef>
+            <a:effectRef idx="0">
+              <a:schemeClr val="accent1"/>
+            </a:effectRef>
+            <a:fontRef idx="minor">
+              <a:schemeClr val="lt1"/>
+            </a:fontRef>
+          </p:style>
+          <p:txBody>
+            <a:bodyPr rtlCol="0" anchor="ctr"/>
+            <a:lstStyle/>
+            <a:p>
+              <a:pPr algn="ctr"/>
+              <a:r>
+                <a:rPr lang="en-US">
+                  <a:solidFill>
+                    <a:srgbClr val="0070C0"/>
+                  </a:solidFill>
+                </a:rPr>
+                <a:t>data</a:t>
+              </a:r>
+            </a:p>
+          </p:txBody>
+        </p:sp>
+        <p:sp>
+          <p:nvSpPr>
+            <p:cNvPr id="14" name="Rectangle 13"/>
+            <p:cNvSpPr/>
+            <p:nvPr/>
+          </p:nvSpPr>
+          <p:spPr>
+            <a:xfrm>
+              <a:off x="8305799" y="4533899"/>
+              <a:ext cx="609600" cy="381000"/>
+            </a:xfrm>
+            <a:prstGeom prst="rect">
+              <a:avLst/>
+            </a:prstGeom>
+            <a:noFill/>
+            <a:ln w="38100"/>
+          </p:spPr>
+          <p:style>
+            <a:lnRef idx="2">
+              <a:schemeClr val="accent1">
+                <a:shade val="50000"/>
+              </a:schemeClr>
+            </a:lnRef>
+            <a:fillRef idx="1">
+              <a:schemeClr val="accent1"/>
+            </a:fillRef>
+            <a:effectRef idx="0">
+              <a:schemeClr val="accent1"/>
+            </a:effectRef>
+            <a:fontRef idx="minor">
+              <a:schemeClr val="lt1"/>
+            </a:fontRef>
+          </p:style>
+          <p:txBody>
+            <a:bodyPr rtlCol="0" anchor="ctr"/>
+            <a:lstStyle/>
+            <a:p>
+              <a:pPr algn="ctr"/>
+              <a:r>
+                <a:rPr lang="en-US" sz="1600">
+                  <a:solidFill>
+                    <a:srgbClr val="FF0000"/>
+                  </a:solidFill>
+                </a:rPr>
+                <a:t>null</a:t>
+              </a:r>
+              <a:endParaRPr lang="en-US" sz="1100">
+                <a:solidFill>
+                  <a:srgbClr val="FF0000"/>
+                </a:solidFill>
+              </a:endParaRPr>
+            </a:p>
+          </p:txBody>
+        </p:sp>
+        <p:cxnSp>
+          <p:nvCxnSpPr>
+            <p:cNvPr id="16" name="Straight Arrow Connector 15"/>
+            <p:cNvCxnSpPr/>
+            <p:nvPr/>
+          </p:nvCxnSpPr>
+          <p:spPr>
+            <a:xfrm rot="10800000" flipV="1">
+              <a:off x="6858002" y="2209799"/>
+              <a:ext cx="1524001" cy="914399"/>
+            </a:xfrm>
+            <a:prstGeom prst="straightConnector1">
+              <a:avLst/>
+            </a:prstGeom>
+            <a:ln w="38100">
+              <a:tailEnd type="arrow"/>
+            </a:ln>
+          </p:spPr>
+          <p:style>
+            <a:lnRef idx="1">
+              <a:schemeClr val="accent1"/>
+            </a:lnRef>
+            <a:fillRef idx="0">
+              <a:schemeClr val="accent1"/>
+            </a:fillRef>
+            <a:effectRef idx="0">
+              <a:schemeClr val="accent1"/>
+            </a:effectRef>
+            <a:fontRef idx="minor">
+              <a:schemeClr val="tx1"/>
+            </a:fontRef>
+          </p:style>
+        </p:cxnSp>
+        <p:cxnSp>
+          <p:nvCxnSpPr>
+            <p:cNvPr id="19" name="Straight Arrow Connector 18"/>
+            <p:cNvCxnSpPr/>
+            <p:nvPr/>
+          </p:nvCxnSpPr>
+          <p:spPr>
+            <a:xfrm rot="10800000" flipV="1">
+              <a:off x="6400800" y="3352798"/>
+              <a:ext cx="1524000" cy="609602"/>
+            </a:xfrm>
+            <a:prstGeom prst="straightConnector1">
+              <a:avLst/>
+            </a:prstGeom>
+            <a:ln w="38100">
+              <a:tailEnd type="arrow"/>
+            </a:ln>
+          </p:spPr>
+          <p:style>
+            <a:lnRef idx="1">
+              <a:schemeClr val="accent1"/>
+            </a:lnRef>
+            <a:fillRef idx="0">
+              <a:schemeClr val="accent1"/>
+            </a:fillRef>
+            <a:effectRef idx="0">
+              <a:schemeClr val="accent1"/>
+            </a:effectRef>
+            <a:fontRef idx="minor">
+              <a:schemeClr val="tx1"/>
+            </a:fontRef>
+          </p:style>
+        </p:cxnSp>
+        <p:cxnSp>
+          <p:nvCxnSpPr>
+            <p:cNvPr id="21" name="Straight Arrow Connector 20"/>
+            <p:cNvCxnSpPr/>
+            <p:nvPr/>
+          </p:nvCxnSpPr>
+          <p:spPr>
+            <a:xfrm rot="5400000">
+              <a:off x="6287295" y="4229895"/>
+              <a:ext cx="1293810" cy="1066800"/>
+            </a:xfrm>
+            <a:prstGeom prst="straightConnector1">
+              <a:avLst/>
+            </a:prstGeom>
+            <a:ln w="38100">
+              <a:tailEnd type="arrow"/>
+            </a:ln>
+          </p:spPr>
+          <p:style>
+            <a:lnRef idx="1">
+              <a:schemeClr val="accent1"/>
+            </a:lnRef>
+            <a:fillRef idx="0">
+              <a:schemeClr val="accent1"/>
+            </a:fillRef>
+            <a:effectRef idx="0">
+              <a:schemeClr val="accent1"/>
+            </a:effectRef>
+            <a:fontRef idx="minor">
+              <a:schemeClr val="tx1"/>
+            </a:fontRef>
+          </p:style>
+        </p:cxnSp>
+        <p:cxnSp>
+          <p:nvCxnSpPr>
+            <p:cNvPr id="24" name="Straight Arrow Connector 23"/>
+            <p:cNvCxnSpPr/>
+            <p:nvPr/>
+          </p:nvCxnSpPr>
+          <p:spPr>
+            <a:xfrm rot="5400000" flipH="1" flipV="1">
+              <a:off x="7143749" y="5238748"/>
+              <a:ext cx="647702" cy="5"/>
+            </a:xfrm>
+            <a:prstGeom prst="straightConnector1">
+              <a:avLst/>
+            </a:prstGeom>
+            <a:ln w="38100">
+              <a:tailEnd type="arrow"/>
+            </a:ln>
+          </p:spPr>
+          <p:style>
+            <a:lnRef idx="1">
+              <a:schemeClr val="accent1"/>
+            </a:lnRef>
+            <a:fillRef idx="0">
+              <a:schemeClr val="accent1"/>
+            </a:fillRef>
+            <a:effectRef idx="0">
+              <a:schemeClr val="accent1"/>
+            </a:effectRef>
+            <a:fontRef idx="minor">
+              <a:schemeClr val="tx1"/>
+            </a:fontRef>
+          </p:style>
+        </p:cxnSp>
+      </p:grpSp>
+      <p:pic>
+        <p:nvPicPr>
+          <p:cNvPr id="1026" name="Picture 2"/>
+          <p:cNvPicPr>
+            <a:picLocks noChangeAspect="1" noChangeArrowheads="1"/>
+          </p:cNvPicPr>
+          <p:nvPr/>
+        </p:nvPicPr>
+        <p:blipFill>
+          <a:blip r:embed="rId3" cstate="print"/>
+          <a:srcRect/>
+          <a:stretch>
+            <a:fillRect/>
+          </a:stretch>
+        </p:blipFill>
+        <p:spPr bwMode="auto">
+          <a:xfrm>
+            <a:off x="228600" y="4724400"/>
+            <a:ext cx="5960823" cy="2057400"/>
+          </a:xfrm>
+          <a:prstGeom prst="rect">
+            <a:avLst/>
+          </a:prstGeom>
+          <a:noFill/>
+          <a:ln w="9525">
+            <a:noFill/>
+            <a:miter lim="800000"/>
+            <a:headEnd/>
+            <a:tailEnd/>
+          </a:ln>
+        </p:spPr>
+      </p:pic>
+      <p:sp>
+        <p:nvSpPr>
+          <p:cNvPr id="32" name="TextBox 31"/>
+          <p:cNvSpPr txBox="1"/>
+          <p:nvPr/>
+        </p:nvSpPr>
+        <p:spPr>
+          <a:xfrm>
+            <a:off x="4722009" y="6412468"/>
+            <a:ext cx="2595582" cy="369332"/>
+          </a:xfrm>
+          <a:prstGeom prst="rect">
+            <a:avLst/>
+          </a:prstGeom>
+          <a:noFill/>
+        </p:spPr>
+        <p:txBody>
+          <a:bodyPr wrap="none" rtlCol="0">
+            <a:spAutoFit/>
+          </a:bodyPr>
+          <a:lstStyle/>
+          <a:p>
+            <a:r>
+              <a:rPr lang="en-US"/>
+              <a:t>Insertion, per Wikipedia</a:t>
+            </a:r>
+          </a:p>
+        </p:txBody>
+      </p:sp>
+      <p:sp>
+        <p:nvSpPr>
+          <p:cNvPr id="20" name="Rectangle 9"/>
+          <p:cNvSpPr>
+            <a:spLocks/>
+          </p:cNvSpPr>
+          <p:nvPr/>
+        </p:nvSpPr>
+        <p:spPr bwMode="auto">
+          <a:xfrm>
+            <a:off x="8432800" y="6334564"/>
+            <a:ext cx="558800" cy="419100"/>
+          </a:xfrm>
+          <a:prstGeom prst="rect">
+            <a:avLst/>
+          </a:prstGeom>
+          <a:ln>
+            <a:headEnd/>
+            <a:tailEnd/>
+          </a:ln>
+        </p:spPr>
+        <p:style>
+          <a:lnRef idx="2">
+            <a:schemeClr val="accent3">
+              <a:shade val="50000"/>
+            </a:schemeClr>
+          </a:lnRef>
+          <a:fillRef idx="1">
+            <a:schemeClr val="accent3"/>
+          </a:fillRef>
+          <a:effectRef idx="0">
+            <a:schemeClr val="accent3"/>
+          </a:effectRef>
+          <a:fontRef idx="minor">
+            <a:schemeClr val="lt1"/>
+          </a:fontRef>
+        </p:style>
+        <p:txBody>
+          <a:bodyPr lIns="0" tIns="0" rIns="0" bIns="0" anchor="ctr"/>
+          <a:lstStyle/>
+          <a:p>
+            <a:pPr algn="ctr">
+              <a:defRPr/>
+            </a:pPr>
+            <a:r>
+              <a:rPr lang="en-US" sz="1800">
+                <a:solidFill>
+                  <a:schemeClr val="bg1"/>
+                </a:solidFill>
+                <a:cs typeface="Arial" pitchFamily="34" charset="0"/>
+                <a:sym typeface="Arial" pitchFamily="34" charset="0"/>
+              </a:rPr>
+              <a:t>Q4-5</a:t>
+            </a:r>
+          </a:p>
+        </p:txBody>
+      </p:sp>
+    </p:spTree>
+  </p:cSld>
+  <p:clrMapOvr>
+    <a:masterClrMapping/>
+  </p:clrMapOvr>
+  <p:timing>
+    <p:tnLst>
+      <p:par>
+        <p:cTn id="1" dur="indefinite" restart="never" nodeType="tmRoot">
+          <p:childTnLst>
+            <p:seq concurrent="1" nextAc="seek">
+              <p:cTn id="2" dur="indefinite" nodeType="mainSeq">
+                <p:childTnLst>
+                  <p:par>
+                    <p:cTn id="3" fill="hold">
+                      <p:stCondLst>
+                        <p:cond delay="indefinite"/>
+                      </p:stCondLst>
+                      <p:childTnLst>
+                        <p:par>
+                          <p:cTn id="4" fill="hold">
+                            <p:stCondLst>
+                              <p:cond delay="0"/>
+                            </p:stCondLst>
+                            <p:childTnLst>
+                              <p:par>
+                                <p:cTn id="5" presetID="1" presetClass="entr" presetSubtype="0" fill="hold" nodeType="clickEffect">
+                                  <p:stCondLst>
+                                    <p:cond delay="0"/>
+                                  </p:stCondLst>
+                                  <p:childTnLst>
+                                    <p:set>
+                                      <p:cBhvr>
+                                        <p:cTn id="6" dur="1" fill="hold">
+                                          <p:stCondLst>
+                                            <p:cond delay="0"/>
+                                          </p:stCondLst>
+                                        </p:cTn>
+                                        <p:tgtEl>
+                                          <p:spTgt spid="1026"/>
+                                        </p:tgtEl>
+                                        <p:attrNameLst>
+                                          <p:attrName>style.visibility</p:attrName>
+                                        </p:attrNameLst>
+                                      </p:cBhvr>
+                                      <p:to>
+                                        <p:strVal val="visible"/>
+                                      </p:to>
+                                    </p:set>
+                                  </p:childTnLst>
+                                </p:cTn>
+                              </p:par>
+                            </p:childTnLst>
+                          </p:cTn>
+                        </p:par>
+                      </p:childTnLst>
+                    </p:cTn>
+                  </p:par>
+                </p:childTnLst>
+              </p:cTn>
+              <p:prevCondLst>
+                <p:cond evt="onPrev" delay="0">
+                  <p:tgtEl>
+                    <p:sldTgt/>
+                  </p:tgtEl>
+                </p:cond>
+              </p:prevCondLst>
+              <p:nextCondLst>
+                <p:cond evt="onNext" delay="0">
+                  <p:tgtEl>
+                    <p:sldTgt/>
+                  </p:tgtEl>
+                </p:cond>
+              </p:nextCondLst>
+            </p:seq>
+          </p:childTnLst>
+        </p:cTn>
+      </p:par>
+    </p:tnLst>
+  </p:timing>
+</p:sld>
+</file>
+
+<file path=ppt/slides/slide22.xml><?xml version="1.0" encoding="utf-8"?>
+<p:sld xmlns:a="http://schemas.openxmlformats.org/drawingml/2006/main" xmlns:r="http://schemas.openxmlformats.org/officeDocument/2006/relationships" xmlns:p="http://schemas.openxmlformats.org/presentationml/2006/main">
+  <p:cSld>
+    <p:spTree>
+      <p:nvGrpSpPr>
+        <p:cNvPr id="1" name=""/>
+        <p:cNvGrpSpPr/>
+        <p:nvPr/>
+      </p:nvGrpSpPr>
+      <p:grpSpPr>
+        <a:xfrm>
+          <a:off x="0" y="0"/>
+          <a:ext cx="0" cy="0"/>
+          <a:chOff x="0" y="0"/>
+          <a:chExt cx="0" cy="0"/>
+        </a:xfrm>
+      </p:grpSpPr>
+      <p:sp>
+        <p:nvSpPr>
+          <p:cNvPr id="3" name="Title 2"/>
+          <p:cNvSpPr>
+            <a:spLocks noGrp="1"/>
+          </p:cNvSpPr>
+          <p:nvPr>
+            <p:ph type="title"/>
+          </p:nvPr>
+        </p:nvSpPr>
+        <p:spPr/>
+        <p:txBody>
+          <a:bodyPr>
+            <a:normAutofit fontScale="90000"/>
+          </a:bodyPr>
+          <a:lstStyle/>
+          <a:p>
+            <a:pPr>
+              <a:defRPr/>
+            </a:pPr>
+            <a:r>
+              <a:rPr lang="en-US" dirty="0">
+                <a:latin typeface="Lucida Sans Typewriter" pitchFamily="49" charset="0"/>
+              </a:rPr>
+              <a:t>Big-O LinkedList&lt;E&gt;</a:t>
+            </a:r>
+            <a:r>
+              <a:rPr lang="en-US" dirty="0"/>
+              <a:t> Methods?</a:t>
+            </a:r>
+          </a:p>
+        </p:txBody>
+      </p:sp>
+      <p:sp>
+        <p:nvSpPr>
+          <p:cNvPr id="2" name="Content Placeholder 1"/>
+          <p:cNvSpPr>
+            <a:spLocks noGrp="1"/>
+          </p:cNvSpPr>
+          <p:nvPr>
+            <p:ph idx="1"/>
+          </p:nvPr>
+        </p:nvSpPr>
+        <p:spPr>
+          <a:xfrm>
+            <a:off x="431800" y="1168400"/>
+            <a:ext cx="8229600" cy="4525963"/>
+          </a:xfrm>
+        </p:spPr>
+        <p:txBody>
+          <a:bodyPr>
+            <a:normAutofit/>
+          </a:bodyPr>
+          <a:lstStyle/>
+          <a:p>
+            <a:pPr>
+              <a:buFont typeface="+mj-lt"/>
+              <a:buAutoNum type="arabicPeriod"/>
+              <a:tabLst>
+                <a:tab pos="4564063" algn="l"/>
+              </a:tabLst>
+              <a:defRPr/>
+            </a:pPr>
+            <a:r>
+              <a:rPr lang="en-US" sz="1800" b="1" dirty="0">
+                <a:latin typeface="Courier New" panose="02070309020205020404" pitchFamily="49" charset="0"/>
+                <a:cs typeface="Courier New" panose="02070309020205020404" pitchFamily="49" charset="0"/>
+              </a:rPr>
+              <a:t>void</a:t>
+            </a:r>
+            <a:r>
+              <a:rPr lang="en-US" sz="1800" dirty="0">
+                <a:latin typeface="Courier New" panose="02070309020205020404" pitchFamily="49" charset="0"/>
+                <a:cs typeface="Courier New" panose="02070309020205020404" pitchFamily="49" charset="0"/>
+              </a:rPr>
+              <a:t> </a:t>
+            </a:r>
+            <a:r>
+              <a:rPr lang="en-US" sz="1800" dirty="0" err="1">
+                <a:latin typeface="Courier New" panose="02070309020205020404" pitchFamily="49" charset="0"/>
+                <a:cs typeface="Courier New" panose="02070309020205020404" pitchFamily="49" charset="0"/>
+              </a:rPr>
+              <a:t>addFirst</a:t>
+            </a:r>
+            <a:r>
+              <a:rPr lang="en-US" sz="1800" dirty="0">
+                <a:latin typeface="Courier New" panose="02070309020205020404" pitchFamily="49" charset="0"/>
+                <a:cs typeface="Courier New" panose="02070309020205020404" pitchFamily="49" charset="0"/>
+              </a:rPr>
+              <a:t>(E element)	_____________</a:t>
+            </a:r>
+          </a:p>
+          <a:p>
+            <a:pPr>
+              <a:buFont typeface="+mj-lt"/>
+              <a:buAutoNum type="arabicPeriod"/>
+              <a:tabLst>
+                <a:tab pos="4564063" algn="l"/>
+              </a:tabLst>
+              <a:defRPr/>
+            </a:pPr>
+            <a:r>
+              <a:rPr lang="en-US" sz="1800" b="1" dirty="0">
+                <a:latin typeface="Courier New" panose="02070309020205020404" pitchFamily="49" charset="0"/>
+                <a:cs typeface="Courier New" panose="02070309020205020404" pitchFamily="49" charset="0"/>
+              </a:rPr>
+              <a:t>void</a:t>
+            </a:r>
+            <a:r>
+              <a:rPr lang="en-US" sz="1800" dirty="0">
+                <a:latin typeface="Courier New" panose="02070309020205020404" pitchFamily="49" charset="0"/>
+                <a:cs typeface="Courier New" panose="02070309020205020404" pitchFamily="49" charset="0"/>
+              </a:rPr>
+              <a:t> </a:t>
+            </a:r>
+            <a:r>
+              <a:rPr lang="en-US" sz="1800" dirty="0" err="1">
+                <a:latin typeface="Courier New" panose="02070309020205020404" pitchFamily="49" charset="0"/>
+                <a:cs typeface="Courier New" panose="02070309020205020404" pitchFamily="49" charset="0"/>
+              </a:rPr>
+              <a:t>addLast</a:t>
+            </a:r>
+            <a:r>
+              <a:rPr lang="en-US" sz="1800" dirty="0">
+                <a:latin typeface="Courier New" panose="02070309020205020404" pitchFamily="49" charset="0"/>
+                <a:cs typeface="Courier New" panose="02070309020205020404" pitchFamily="49" charset="0"/>
+              </a:rPr>
+              <a:t>(E element) 	_____________</a:t>
+            </a:r>
+          </a:p>
+          <a:p>
+            <a:pPr>
+              <a:buFont typeface="+mj-lt"/>
+              <a:buAutoNum type="arabicPeriod"/>
+              <a:tabLst>
+                <a:tab pos="4564063" algn="l"/>
+              </a:tabLst>
+              <a:defRPr/>
+            </a:pPr>
+            <a:r>
+              <a:rPr lang="en-US" sz="1800" dirty="0">
+                <a:latin typeface="Courier New" panose="02070309020205020404" pitchFamily="49" charset="0"/>
+                <a:cs typeface="Courier New" panose="02070309020205020404" pitchFamily="49" charset="0"/>
+              </a:rPr>
+              <a:t>E </a:t>
+            </a:r>
+            <a:r>
+              <a:rPr lang="en-US" sz="1800" dirty="0" err="1">
+                <a:latin typeface="Courier New" panose="02070309020205020404" pitchFamily="49" charset="0"/>
+                <a:cs typeface="Courier New" panose="02070309020205020404" pitchFamily="49" charset="0"/>
+              </a:rPr>
+              <a:t>getFirst</a:t>
+            </a:r>
+            <a:r>
+              <a:rPr lang="en-US" sz="1800" dirty="0">
+                <a:latin typeface="Courier New" panose="02070309020205020404" pitchFamily="49" charset="0"/>
+                <a:cs typeface="Courier New" panose="02070309020205020404" pitchFamily="49" charset="0"/>
+              </a:rPr>
+              <a:t>() 	_____________</a:t>
+            </a:r>
+          </a:p>
+          <a:p>
+            <a:pPr>
+              <a:buFont typeface="+mj-lt"/>
+              <a:buAutoNum type="arabicPeriod"/>
+              <a:tabLst>
+                <a:tab pos="4564063" algn="l"/>
+              </a:tabLst>
+              <a:defRPr/>
+            </a:pPr>
+            <a:r>
+              <a:rPr lang="en-US" sz="1800" dirty="0">
+                <a:latin typeface="Courier New" panose="02070309020205020404" pitchFamily="49" charset="0"/>
+                <a:cs typeface="Courier New" panose="02070309020205020404" pitchFamily="49" charset="0"/>
+              </a:rPr>
+              <a:t>E </a:t>
+            </a:r>
+            <a:r>
+              <a:rPr lang="en-US" sz="1800" dirty="0" err="1">
+                <a:latin typeface="Courier New" panose="02070309020205020404" pitchFamily="49" charset="0"/>
+                <a:cs typeface="Courier New" panose="02070309020205020404" pitchFamily="49" charset="0"/>
+              </a:rPr>
+              <a:t>getLast</a:t>
+            </a:r>
+            <a:r>
+              <a:rPr lang="en-US" sz="1800" dirty="0">
+                <a:latin typeface="Courier New" panose="02070309020205020404" pitchFamily="49" charset="0"/>
+                <a:cs typeface="Courier New" panose="02070309020205020404" pitchFamily="49" charset="0"/>
+              </a:rPr>
+              <a:t>() 	_____________</a:t>
+            </a:r>
+          </a:p>
+          <a:p>
+            <a:pPr>
+              <a:buFont typeface="+mj-lt"/>
+              <a:buAutoNum type="arabicPeriod"/>
+              <a:tabLst>
+                <a:tab pos="4564063" algn="l"/>
+              </a:tabLst>
+              <a:defRPr/>
+            </a:pPr>
+            <a:r>
+              <a:rPr lang="en-US" sz="1800" dirty="0">
+                <a:latin typeface="Courier New" panose="02070309020205020404" pitchFamily="49" charset="0"/>
+                <a:cs typeface="Courier New" panose="02070309020205020404" pitchFamily="49" charset="0"/>
+              </a:rPr>
+              <a:t>E </a:t>
+            </a:r>
+            <a:r>
+              <a:rPr lang="en-US" sz="1800" dirty="0" err="1">
+                <a:latin typeface="Courier New" panose="02070309020205020404" pitchFamily="49" charset="0"/>
+                <a:cs typeface="Courier New" panose="02070309020205020404" pitchFamily="49" charset="0"/>
+              </a:rPr>
+              <a:t>removeFirst</a:t>
+            </a:r>
+            <a:r>
+              <a:rPr lang="en-US" sz="1800" dirty="0">
+                <a:latin typeface="Courier New" panose="02070309020205020404" pitchFamily="49" charset="0"/>
+                <a:cs typeface="Courier New" panose="02070309020205020404" pitchFamily="49" charset="0"/>
+              </a:rPr>
+              <a:t>() 	_____________</a:t>
+            </a:r>
+          </a:p>
+          <a:p>
+            <a:pPr>
+              <a:buFont typeface="+mj-lt"/>
+              <a:buAutoNum type="arabicPeriod"/>
+              <a:tabLst>
+                <a:tab pos="4564063" algn="l"/>
+              </a:tabLst>
+              <a:defRPr/>
+            </a:pPr>
+            <a:r>
+              <a:rPr lang="en-US" sz="1800" dirty="0">
+                <a:latin typeface="Courier New" panose="02070309020205020404" pitchFamily="49" charset="0"/>
+                <a:cs typeface="Courier New" panose="02070309020205020404" pitchFamily="49" charset="0"/>
+              </a:rPr>
+              <a:t>E </a:t>
+            </a:r>
+            <a:r>
+              <a:rPr lang="en-US" sz="1800" dirty="0" err="1">
+                <a:latin typeface="Courier New" panose="02070309020205020404" pitchFamily="49" charset="0"/>
+                <a:cs typeface="Courier New" panose="02070309020205020404" pitchFamily="49" charset="0"/>
+              </a:rPr>
+              <a:t>removeLast</a:t>
+            </a:r>
+            <a:r>
+              <a:rPr lang="en-US" sz="1800" dirty="0">
+                <a:latin typeface="Courier New" panose="02070309020205020404" pitchFamily="49" charset="0"/>
+                <a:cs typeface="Courier New" panose="02070309020205020404" pitchFamily="49" charset="0"/>
+              </a:rPr>
+              <a:t>() 	_____________</a:t>
+            </a:r>
+          </a:p>
+        </p:txBody>
+      </p:sp>
+      <p:pic>
+        <p:nvPicPr>
+          <p:cNvPr id="5" name="Picture 4" descr="Diagram&#10;&#10;Description automatically generated">
+            <a:extLst>
+              <a:ext uri="{FF2B5EF4-FFF2-40B4-BE49-F238E27FC236}">
+                <a16:creationId xmlns:a16="http://schemas.microsoft.com/office/drawing/2014/main" id="{26C68BB4-FE19-754E-9980-9B004E76ACE2}"/>
+              </a:ext>
+            </a:extLst>
+          </p:cNvPr>
+          <p:cNvPicPr>
+            <a:picLocks noChangeAspect="1"/>
+          </p:cNvPicPr>
+          <p:nvPr/>
+        </p:nvPicPr>
+        <p:blipFill>
+          <a:blip r:embed="rId3">
+            <a:extLst>
+              <a:ext uri="{28A0092B-C50C-407E-A947-70E740481C1C}">
+                <a14:useLocalDpi xmlns:a14="http://schemas.microsoft.com/office/drawing/2010/main" val="0"/>
+              </a:ext>
+            </a:extLst>
+          </a:blip>
+          <a:stretch>
+            <a:fillRect/>
+          </a:stretch>
+        </p:blipFill>
+        <p:spPr>
+          <a:xfrm>
+            <a:off x="1600200" y="3182759"/>
+            <a:ext cx="7391399" cy="3472041"/>
+          </a:xfrm>
+          <a:prstGeom prst="rect">
+            <a:avLst/>
+          </a:prstGeom>
+        </p:spPr>
+      </p:pic>
+    </p:spTree>
+  </p:cSld>
+  <p:clrMapOvr>
+    <a:masterClrMapping/>
+  </p:clrMapOvr>
+</p:sld>
+</file>
+
+<file path=ppt/slides/slide23.xml><?xml version="1.0" encoding="utf-8"?>
+<p:sld xmlns:a="http://schemas.openxmlformats.org/drawingml/2006/main" xmlns:r="http://schemas.openxmlformats.org/officeDocument/2006/relationships" xmlns:p="http://schemas.openxmlformats.org/presentationml/2006/main">
+  <p:cSld>
+    <p:spTree>
+      <p:nvGrpSpPr>
+        <p:cNvPr id="1" name=""/>
+        <p:cNvGrpSpPr/>
+        <p:nvPr/>
+      </p:nvGrpSpPr>
+      <p:grpSpPr>
+        <a:xfrm>
+          <a:off x="0" y="0"/>
+          <a:ext cx="0" cy="0"/>
+          <a:chOff x="0" y="0"/>
+          <a:chExt cx="0" cy="0"/>
+        </a:xfrm>
+      </p:grpSpPr>
+      <p:sp>
+        <p:nvSpPr>
+          <p:cNvPr id="2" name="Title 1"/>
+          <p:cNvSpPr>
+            <a:spLocks noGrp="1"/>
+          </p:cNvSpPr>
+          <p:nvPr>
+            <p:ph type="title"/>
+          </p:nvPr>
+        </p:nvSpPr>
+        <p:spPr/>
+        <p:txBody>
+          <a:bodyPr/>
+          <a:lstStyle/>
+          <a:p>
+            <a:r>
+              <a:rPr lang="en-US" dirty="0"/>
+              <a:t>Homework</a:t>
+            </a:r>
+          </a:p>
+        </p:txBody>
+      </p:sp>
+      <p:sp>
+        <p:nvSpPr>
+          <p:cNvPr id="3" name="Content Placeholder 2"/>
+          <p:cNvSpPr>
+            <a:spLocks noGrp="1"/>
+          </p:cNvSpPr>
+          <p:nvPr>
+            <p:ph idx="1"/>
+          </p:nvPr>
+        </p:nvSpPr>
+        <p:spPr/>
+        <p:txBody>
+          <a:bodyPr/>
+          <a:lstStyle/>
+          <a:p>
+            <a:r>
+              <a:rPr lang="en-US" dirty="0" err="1"/>
+              <a:t>SinglyLinkedList</a:t>
+            </a:r>
+            <a:endParaRPr lang="en-US" dirty="0"/>
+          </a:p>
+          <a:p>
+            <a:pPr lvl="1"/>
+            <a:r>
+              <a:rPr lang="en-US" dirty="0"/>
+              <a:t>Requires you to implement a </a:t>
+            </a:r>
+            <a:r>
+              <a:rPr lang="en-US" dirty="0" err="1"/>
+              <a:t>SinglyLinkedList</a:t>
+            </a:r>
+            <a:endParaRPr lang="en-US" dirty="0"/>
+          </a:p>
+          <a:p>
+            <a:pPr lvl="1"/>
+            <a:r>
+              <a:rPr lang="en-US" dirty="0"/>
+              <a:t>Additional algorithm questions which make use of the </a:t>
+            </a:r>
+            <a:r>
+              <a:rPr lang="en-US" dirty="0" err="1"/>
+              <a:t>SinglyLinkedList</a:t>
+            </a:r>
+            <a:endParaRPr lang="en-US" dirty="0"/>
+          </a:p>
+          <a:p>
+            <a:pPr lvl="1"/>
+            <a:r>
+              <a:rPr lang="en-US" dirty="0"/>
+              <a:t>Will give you remaining class time to work on it</a:t>
+            </a:r>
+          </a:p>
+          <a:p>
+            <a:pPr lvl="1"/>
+            <a:r>
+              <a:rPr lang="en-US" dirty="0"/>
+              <a:t>If you complete it, work on the project!</a:t>
+            </a:r>
+          </a:p>
+        </p:txBody>
+      </p:sp>
+    </p:spTree>
+    <p:extLst>
+      <p:ext uri="{BB962C8B-B14F-4D97-AF65-F5344CB8AC3E}">
+        <p14:creationId xmlns:p14="http://schemas.microsoft.com/office/powerpoint/2010/main" val="1503594254"/>
       </p:ext>
     </p:extLst>
   </p:cSld>
@@ -9156,18 +13232,18 @@
 </file>
 
 <file path=customXml/item1.xml><?xml version="1.0" encoding="utf-8"?>
-<p:properties xmlns:p="http://schemas.microsoft.com/office/2006/metadata/properties" xmlns:xsi="http://www.w3.org/2001/XMLSchema-instance" xmlns:pc="http://schemas.microsoft.com/office/infopath/2007/PartnerControls">
-  <documentManagement/>
-</p:properties>
-</file>
-
-<file path=customXml/item2.xml><?xml version="1.0" encoding="utf-8"?>
 <?mso-contentType ?>
 <FormTemplates xmlns="http://schemas.microsoft.com/sharepoint/v3/contenttype/forms">
   <Display>DocumentLibraryForm</Display>
   <Edit>DocumentLibraryForm</Edit>
   <New>DocumentLibraryForm</New>
 </FormTemplates>
+</file>
+
+<file path=customXml/item2.xml><?xml version="1.0" encoding="utf-8"?>
+<p:properties xmlns:p="http://schemas.microsoft.com/office/2006/metadata/properties" xmlns:xsi="http://www.w3.org/2001/XMLSchema-instance" xmlns:pc="http://schemas.microsoft.com/office/infopath/2007/PartnerControls">
+  <documentManagement/>
+</p:properties>
 </file>
 
 <file path=customXml/item3.xml><?xml version="1.0" encoding="utf-8"?>
@@ -9355,18 +13431,18 @@
 </file>
 
 <file path=customXml/itemProps1.xml><?xml version="1.0" encoding="utf-8"?>
-<ds:datastoreItem xmlns:ds="http://schemas.openxmlformats.org/officeDocument/2006/customXml" ds:itemID="{32EB23CE-1CD2-4B69-9E50-DC66E79D388B}">
+<ds:datastoreItem xmlns:ds="http://schemas.openxmlformats.org/officeDocument/2006/customXml" ds:itemID="{65F6D3FF-4230-44B7-891A-B84816FD1392}">
   <ds:schemaRefs>
-    <ds:schemaRef ds:uri="http://schemas.microsoft.com/office/2006/metadata/properties"/>
-    <ds:schemaRef ds:uri="http://schemas.microsoft.com/office/infopath/2007/PartnerControls"/>
+    <ds:schemaRef ds:uri="http://schemas.microsoft.com/sharepoint/v3/contenttype/forms"/>
   </ds:schemaRefs>
 </ds:datastoreItem>
 </file>
 
 <file path=customXml/itemProps2.xml><?xml version="1.0" encoding="utf-8"?>
-<ds:datastoreItem xmlns:ds="http://schemas.openxmlformats.org/officeDocument/2006/customXml" ds:itemID="{65F6D3FF-4230-44B7-891A-B84816FD1392}">
+<ds:datastoreItem xmlns:ds="http://schemas.openxmlformats.org/officeDocument/2006/customXml" ds:itemID="{32EB23CE-1CD2-4B69-9E50-DC66E79D388B}">
   <ds:schemaRefs>
-    <ds:schemaRef ds:uri="http://schemas.microsoft.com/sharepoint/v3/contenttype/forms"/>
+    <ds:schemaRef ds:uri="http://schemas.microsoft.com/office/2006/metadata/properties"/>
+    <ds:schemaRef ds:uri="http://schemas.microsoft.com/office/infopath/2007/PartnerControls"/>
   </ds:schemaRefs>
 </ds:datastoreItem>
 </file>

</xml_diff>

<commit_message>
fixed typos in Big-O slides
</commit_message>
<xml_diff>
--- a/ClassMaterials/LinkedLists/Slides/LinkedLists.pptx
+++ b/ClassMaterials/LinkedLists/Slides/LinkedLists.pptx
@@ -6690,88 +6690,12 @@
           <a:chExt cx="0" cy="0"/>
         </a:xfrm>
       </p:grpSpPr>
-      <p:sp>
-        <p:nvSpPr>
-          <p:cNvPr id="4" name="Title 3"/>
-          <p:cNvSpPr>
-            <a:spLocks noGrp="1"/>
-          </p:cNvSpPr>
-          <p:nvPr>
-            <p:ph type="title"/>
-          </p:nvPr>
-        </p:nvSpPr>
-        <p:spPr>
-          <a:xfrm>
-            <a:off x="500742" y="78695"/>
-            <a:ext cx="8229600" cy="1143000"/>
-          </a:xfrm>
-        </p:spPr>
-        <p:txBody>
-          <a:bodyPr/>
-          <a:lstStyle/>
-          <a:p>
-            <a:pPr>
-              <a:defRPr/>
-            </a:pPr>
-            <a:r>
-              <a:rPr lang="en-US" dirty="0" err="1"/>
-              <a:t>ArrayList</a:t>
-            </a:r>
-            <a:r>
-              <a:rPr lang="en-US" dirty="0"/>
-              <a:t> Data Structure in Java</a:t>
-            </a:r>
-          </a:p>
-        </p:txBody>
-      </p:sp>
-      <p:sp>
-        <p:nvSpPr>
-          <p:cNvPr id="12290" name="Content Placeholder 4"/>
-          <p:cNvSpPr>
-            <a:spLocks noGrp="1"/>
-          </p:cNvSpPr>
-          <p:nvPr>
-            <p:ph idx="1"/>
-          </p:nvPr>
-        </p:nvSpPr>
-        <p:spPr>
-          <a:xfrm>
-            <a:off x="424543" y="914400"/>
-            <a:ext cx="8229600" cy="4885192"/>
-          </a:xfrm>
-        </p:spPr>
-        <p:txBody>
-          <a:bodyPr>
-            <a:normAutofit/>
-          </a:bodyPr>
-          <a:lstStyle/>
-          <a:p>
-            <a:pPr lvl="1"/>
-            <a:r>
-              <a:rPr lang="en-US" dirty="0"/>
-              <a:t>Fast addition </a:t>
-            </a:r>
-            <a:r>
-              <a:rPr lang="en-US" b="1" dirty="0"/>
-              <a:t>to end of list</a:t>
-            </a:r>
-            <a:br>
-              <a:rPr lang="en-US" b="1" dirty="0"/>
-            </a:br>
-            <a:r>
-              <a:rPr lang="en-US" sz="2400" dirty="0"/>
-              <a:t>Requires 1 multiplication and 1 addition to compute address</a:t>
-            </a:r>
-            <a:endParaRPr lang="en-US" sz="2400" b="1" dirty="0"/>
-          </a:p>
-        </p:txBody>
-      </p:sp>
       <p:pic>
         <p:nvPicPr>
-          <p:cNvPr id="3" name="Picture 2" descr="Graphical user interface&#10;&#10;Description automatically generated with medium confidence">
+          <p:cNvPr id="2" name="Picture 1">
             <a:extLst>
               <a:ext uri="{FF2B5EF4-FFF2-40B4-BE49-F238E27FC236}">
-                <a16:creationId xmlns:a16="http://schemas.microsoft.com/office/drawing/2014/main" id="{63700C4F-FFD7-4B45-A727-EEC331387E3B}"/>
+                <a16:creationId xmlns:a16="http://schemas.microsoft.com/office/drawing/2014/main" id="{37D4294C-2FF2-382F-284F-CAC867A826DE}"/>
               </a:ext>
             </a:extLst>
           </p:cNvPr>
@@ -6781,27 +6705,97 @@
           <p:nvPr/>
         </p:nvPicPr>
         <p:blipFill>
-          <a:blip r:embed="rId3">
-            <a:extLst>
-              <a:ext uri="{28A0092B-C50C-407E-A947-70E740481C1C}">
-                <a14:useLocalDpi xmlns:a14="http://schemas.microsoft.com/office/drawing/2010/main" val="0"/>
-              </a:ext>
-            </a:extLst>
-          </a:blip>
+          <a:blip r:embed="rId3"/>
           <a:stretch>
             <a:fillRect/>
           </a:stretch>
         </p:blipFill>
         <p:spPr>
           <a:xfrm>
-            <a:off x="1208314" y="2081147"/>
-            <a:ext cx="5334000" cy="4544375"/>
+            <a:off x="1328055" y="2100944"/>
+            <a:ext cx="5334000" cy="4546600"/>
           </a:xfrm>
           <a:prstGeom prst="rect">
             <a:avLst/>
           </a:prstGeom>
         </p:spPr>
       </p:pic>
+      <p:sp>
+        <p:nvSpPr>
+          <p:cNvPr id="4" name="Title 3"/>
+          <p:cNvSpPr>
+            <a:spLocks noGrp="1"/>
+          </p:cNvSpPr>
+          <p:nvPr>
+            <p:ph type="title"/>
+          </p:nvPr>
+        </p:nvSpPr>
+        <p:spPr>
+          <a:xfrm>
+            <a:off x="500742" y="78695"/>
+            <a:ext cx="8229600" cy="1143000"/>
+          </a:xfrm>
+        </p:spPr>
+        <p:txBody>
+          <a:bodyPr/>
+          <a:lstStyle/>
+          <a:p>
+            <a:pPr>
+              <a:defRPr/>
+            </a:pPr>
+            <a:r>
+              <a:rPr lang="en-US" dirty="0" err="1"/>
+              <a:t>ArrayList</a:t>
+            </a:r>
+            <a:r>
+              <a:rPr lang="en-US" dirty="0"/>
+              <a:t> Data Structure in Java</a:t>
+            </a:r>
+          </a:p>
+        </p:txBody>
+      </p:sp>
+      <p:sp>
+        <p:nvSpPr>
+          <p:cNvPr id="12290" name="Content Placeholder 4"/>
+          <p:cNvSpPr>
+            <a:spLocks noGrp="1"/>
+          </p:cNvSpPr>
+          <p:nvPr>
+            <p:ph idx="1"/>
+          </p:nvPr>
+        </p:nvSpPr>
+        <p:spPr>
+          <a:xfrm>
+            <a:off x="424543" y="914400"/>
+            <a:ext cx="8229600" cy="4885192"/>
+          </a:xfrm>
+        </p:spPr>
+        <p:txBody>
+          <a:bodyPr>
+            <a:normAutofit/>
+          </a:bodyPr>
+          <a:lstStyle/>
+          <a:p>
+            <a:pPr lvl="1"/>
+            <a:r>
+              <a:rPr lang="en-US" dirty="0"/>
+              <a:t>Fast addition </a:t>
+            </a:r>
+            <a:r>
+              <a:rPr lang="en-US" b="1" dirty="0"/>
+              <a:t>to end of list</a:t>
+            </a:r>
+            <a:br>
+              <a:rPr lang="en-US" b="1" dirty="0"/>
+            </a:br>
+            <a:r>
+              <a:rPr lang="en-US" sz="2400" dirty="0"/>
+              <a:t>Requires 1 multiplication and 1 addition to compute address</a:t>
+            </a:r>
+            <a:endParaRPr lang="en-US" sz="2400" b="1" dirty="0"/>
+          </a:p>
+        </p:txBody>
+      </p:sp>
       <p:sp>
         <p:nvSpPr>
           <p:cNvPr id="5" name="Freeform 4">
@@ -7234,10 +7228,10 @@
       </p:sp>
       <p:pic>
         <p:nvPicPr>
-          <p:cNvPr id="3" name="Picture 2" descr="Diagram&#10;&#10;Description automatically generated with medium confidence">
+          <p:cNvPr id="2" name="Picture 1">
             <a:extLst>
               <a:ext uri="{FF2B5EF4-FFF2-40B4-BE49-F238E27FC236}">
-                <a16:creationId xmlns:a16="http://schemas.microsoft.com/office/drawing/2014/main" id="{FFDC3466-A7E9-9B4E-8E69-B0D42FE383C1}"/>
+                <a16:creationId xmlns:a16="http://schemas.microsoft.com/office/drawing/2014/main" id="{0EF13401-0F2C-A1A4-CAE5-115E27630962}"/>
               </a:ext>
             </a:extLst>
           </p:cNvPr>
@@ -7247,21 +7241,15 @@
           <p:nvPr/>
         </p:nvPicPr>
         <p:blipFill>
-          <a:blip r:embed="rId3">
-            <a:extLst>
-              <a:ext uri="{28A0092B-C50C-407E-A947-70E740481C1C}">
-                <a14:useLocalDpi xmlns:a14="http://schemas.microsoft.com/office/drawing/2010/main" val="0"/>
-              </a:ext>
-            </a:extLst>
-          </a:blip>
+          <a:blip r:embed="rId3"/>
           <a:stretch>
             <a:fillRect/>
           </a:stretch>
         </p:blipFill>
         <p:spPr>
           <a:xfrm>
-            <a:off x="397289" y="1520963"/>
-            <a:ext cx="8369300" cy="4432300"/>
+            <a:off x="685800" y="1683405"/>
+            <a:ext cx="7772400" cy="4116187"/>
           </a:xfrm>
           <a:prstGeom prst="rect">
             <a:avLst/>
@@ -13241,12 +13229,6 @@
 </file>
 
 <file path=customXml/item2.xml><?xml version="1.0" encoding="utf-8"?>
-<p:properties xmlns:p="http://schemas.microsoft.com/office/2006/metadata/properties" xmlns:xsi="http://www.w3.org/2001/XMLSchema-instance" xmlns:pc="http://schemas.microsoft.com/office/infopath/2007/PartnerControls">
-  <documentManagement/>
-</p:properties>
-</file>
-
-<file path=customXml/item3.xml><?xml version="1.0" encoding="utf-8"?>
 <ct:contentTypeSchema xmlns:ct="http://schemas.microsoft.com/office/2006/metadata/contentType" xmlns:ma="http://schemas.microsoft.com/office/2006/metadata/properties/metaAttributes" ct:_="" ma:_="" ma:contentTypeName="Document" ma:contentTypeID="0x0101001570BCAAD2E4294F9443DCB038A55380" ma:contentTypeVersion="10" ma:contentTypeDescription="Create a new document." ma:contentTypeScope="" ma:versionID="84c2e02ee7a0dfaa743622fbac484332">
   <xsd:schema xmlns:xsd="http://www.w3.org/2001/XMLSchema" xmlns:xs="http://www.w3.org/2001/XMLSchema" xmlns:p="http://schemas.microsoft.com/office/2006/metadata/properties" xmlns:ns2="201674f6-2bdd-4f13-ba1e-424e4aa70473" targetNamespace="http://schemas.microsoft.com/office/2006/metadata/properties" ma:root="true" ma:fieldsID="0b220e6722f2c0d473d2d30e5cad202c" ns2:_="">
     <xsd:import namespace="201674f6-2bdd-4f13-ba1e-424e4aa70473"/>
@@ -13430,6 +13412,12 @@
 </ct:contentTypeSchema>
 </file>
 
+<file path=customXml/item3.xml><?xml version="1.0" encoding="utf-8"?>
+<p:properties xmlns:p="http://schemas.microsoft.com/office/2006/metadata/properties" xmlns:xsi="http://www.w3.org/2001/XMLSchema-instance" xmlns:pc="http://schemas.microsoft.com/office/infopath/2007/PartnerControls">
+  <documentManagement/>
+</p:properties>
+</file>
+
 <file path=customXml/itemProps1.xml><?xml version="1.0" encoding="utf-8"?>
 <ds:datastoreItem xmlns:ds="http://schemas.openxmlformats.org/officeDocument/2006/customXml" ds:itemID="{65F6D3FF-4230-44B7-891A-B84816FD1392}">
   <ds:schemaRefs>
@@ -13439,15 +13427,6 @@
 </file>
 
 <file path=customXml/itemProps2.xml><?xml version="1.0" encoding="utf-8"?>
-<ds:datastoreItem xmlns:ds="http://schemas.openxmlformats.org/officeDocument/2006/customXml" ds:itemID="{32EB23CE-1CD2-4B69-9E50-DC66E79D388B}">
-  <ds:schemaRefs>
-    <ds:schemaRef ds:uri="http://schemas.microsoft.com/office/2006/metadata/properties"/>
-    <ds:schemaRef ds:uri="http://schemas.microsoft.com/office/infopath/2007/PartnerControls"/>
-  </ds:schemaRefs>
-</ds:datastoreItem>
-</file>
-
-<file path=customXml/itemProps3.xml><?xml version="1.0" encoding="utf-8"?>
 <ds:datastoreItem xmlns:ds="http://schemas.openxmlformats.org/officeDocument/2006/customXml" ds:itemID="{922F283B-6588-4A17-9501-58C69A53AC37}">
   <ds:schemaRefs>
     <ds:schemaRef ds:uri="http://schemas.microsoft.com/office/2006/metadata/contentType"/>
@@ -13463,4 +13442,13 @@
     <ds:schemaRef ds:uri="http://schemas.microsoft.com/internal/obd"/>
   </ds:schemaRefs>
 </ds:datastoreItem>
+</file>
+
+<file path=customXml/itemProps3.xml><?xml version="1.0" encoding="utf-8"?>
+<ds:datastoreItem xmlns:ds="http://schemas.openxmlformats.org/officeDocument/2006/customXml" ds:itemID="{32EB23CE-1CD2-4B69-9E50-DC66E79D388B}">
+  <ds:schemaRefs>
+    <ds:schemaRef ds:uri="http://schemas.microsoft.com/office/2006/metadata/properties"/>
+    <ds:schemaRef ds:uri="http://schemas.microsoft.com/office/infopath/2007/PartnerControls"/>
+  </ds:schemaRefs>
+</ds:datastoreItem>
 </file>
</xml_diff>